<commit_message>
updates and motor Nuron costume
</commit_message>
<xml_diff>
--- a/guide/hookup-diagram.pptx
+++ b/guide/hookup-diagram.pptx
@@ -6,9 +6,11 @@
   </p:sldMasterIdLst>
   <p:sldIdLst>
     <p:sldId id="256" r:id="rId2"/>
+    <p:sldId id="257" r:id="rId3"/>
+    <p:sldId id="258" r:id="rId4"/>
   </p:sldIdLst>
   <p:sldSz cx="9144000" cy="6858000" type="screen4x3"/>
-  <p:notesSz cx="6858000" cy="9144000"/>
+  <p:notesSz cx="7315200" cy="9601200"/>
   <p:defaultTextStyle>
     <a:defPPr>
       <a:defRPr lang="en-US"/>
@@ -288,7 +290,8 @@
           <a:p>
             <a:fld id="{317AB7BE-5419-40D2-978B-E265E72EA34A}" type="datetimeFigureOut">
               <a:rPr lang="en-US" smtClean="0"/>
-              <a:t>10/12/2015</a:t>
+              <a:pPr/>
+              <a:t>10/15/2015</a:t>
             </a:fld>
             <a:endParaRPr lang="en-US"/>
           </a:p>
@@ -330,6 +333,7 @@
           <a:p>
             <a:fld id="{3D1A9E0E-01FC-479B-8C22-7C67BAB0EA61}" type="slidenum">
               <a:rPr lang="en-US" smtClean="0"/>
+              <a:pPr/>
               <a:t>‹#›</a:t>
             </a:fld>
             <a:endParaRPr lang="en-US"/>
@@ -453,7 +457,8 @@
           <a:p>
             <a:fld id="{317AB7BE-5419-40D2-978B-E265E72EA34A}" type="datetimeFigureOut">
               <a:rPr lang="en-US" smtClean="0"/>
-              <a:t>10/12/2015</a:t>
+              <a:pPr/>
+              <a:t>10/15/2015</a:t>
             </a:fld>
             <a:endParaRPr lang="en-US"/>
           </a:p>
@@ -495,6 +500,7 @@
           <a:p>
             <a:fld id="{3D1A9E0E-01FC-479B-8C22-7C67BAB0EA61}" type="slidenum">
               <a:rPr lang="en-US" smtClean="0"/>
+              <a:pPr/>
               <a:t>‹#›</a:t>
             </a:fld>
             <a:endParaRPr lang="en-US"/>
@@ -628,7 +634,8 @@
           <a:p>
             <a:fld id="{317AB7BE-5419-40D2-978B-E265E72EA34A}" type="datetimeFigureOut">
               <a:rPr lang="en-US" smtClean="0"/>
-              <a:t>10/12/2015</a:t>
+              <a:pPr/>
+              <a:t>10/15/2015</a:t>
             </a:fld>
             <a:endParaRPr lang="en-US"/>
           </a:p>
@@ -670,6 +677,7 @@
           <a:p>
             <a:fld id="{3D1A9E0E-01FC-479B-8C22-7C67BAB0EA61}" type="slidenum">
               <a:rPr lang="en-US" smtClean="0"/>
+              <a:pPr/>
               <a:t>‹#›</a:t>
             </a:fld>
             <a:endParaRPr lang="en-US"/>
@@ -793,7 +801,8 @@
           <a:p>
             <a:fld id="{317AB7BE-5419-40D2-978B-E265E72EA34A}" type="datetimeFigureOut">
               <a:rPr lang="en-US" smtClean="0"/>
-              <a:t>10/12/2015</a:t>
+              <a:pPr/>
+              <a:t>10/15/2015</a:t>
             </a:fld>
             <a:endParaRPr lang="en-US"/>
           </a:p>
@@ -835,6 +844,7 @@
           <a:p>
             <a:fld id="{3D1A9E0E-01FC-479B-8C22-7C67BAB0EA61}" type="slidenum">
               <a:rPr lang="en-US" smtClean="0"/>
+              <a:pPr/>
               <a:t>‹#›</a:t>
             </a:fld>
             <a:endParaRPr lang="en-US"/>
@@ -1034,7 +1044,8 @@
           <a:p>
             <a:fld id="{317AB7BE-5419-40D2-978B-E265E72EA34A}" type="datetimeFigureOut">
               <a:rPr lang="en-US" smtClean="0"/>
-              <a:t>10/12/2015</a:t>
+              <a:pPr/>
+              <a:t>10/15/2015</a:t>
             </a:fld>
             <a:endParaRPr lang="en-US"/>
           </a:p>
@@ -1076,6 +1087,7 @@
           <a:p>
             <a:fld id="{3D1A9E0E-01FC-479B-8C22-7C67BAB0EA61}" type="slidenum">
               <a:rPr lang="en-US" smtClean="0"/>
+              <a:pPr/>
               <a:t>‹#›</a:t>
             </a:fld>
             <a:endParaRPr lang="en-US"/>
@@ -1317,7 +1329,8 @@
           <a:p>
             <a:fld id="{317AB7BE-5419-40D2-978B-E265E72EA34A}" type="datetimeFigureOut">
               <a:rPr lang="en-US" smtClean="0"/>
-              <a:t>10/12/2015</a:t>
+              <a:pPr/>
+              <a:t>10/15/2015</a:t>
             </a:fld>
             <a:endParaRPr lang="en-US"/>
           </a:p>
@@ -1359,6 +1372,7 @@
           <a:p>
             <a:fld id="{3D1A9E0E-01FC-479B-8C22-7C67BAB0EA61}" type="slidenum">
               <a:rPr lang="en-US" smtClean="0"/>
+              <a:pPr/>
               <a:t>‹#›</a:t>
             </a:fld>
             <a:endParaRPr lang="en-US"/>
@@ -1734,7 +1748,8 @@
           <a:p>
             <a:fld id="{317AB7BE-5419-40D2-978B-E265E72EA34A}" type="datetimeFigureOut">
               <a:rPr lang="en-US" smtClean="0"/>
-              <a:t>10/12/2015</a:t>
+              <a:pPr/>
+              <a:t>10/15/2015</a:t>
             </a:fld>
             <a:endParaRPr lang="en-US"/>
           </a:p>
@@ -1776,6 +1791,7 @@
           <a:p>
             <a:fld id="{3D1A9E0E-01FC-479B-8C22-7C67BAB0EA61}" type="slidenum">
               <a:rPr lang="en-US" smtClean="0"/>
+              <a:pPr/>
               <a:t>‹#›</a:t>
             </a:fld>
             <a:endParaRPr lang="en-US"/>
@@ -1847,7 +1863,8 @@
           <a:p>
             <a:fld id="{317AB7BE-5419-40D2-978B-E265E72EA34A}" type="datetimeFigureOut">
               <a:rPr lang="en-US" smtClean="0"/>
-              <a:t>10/12/2015</a:t>
+              <a:pPr/>
+              <a:t>10/15/2015</a:t>
             </a:fld>
             <a:endParaRPr lang="en-US"/>
           </a:p>
@@ -1889,6 +1906,7 @@
           <a:p>
             <a:fld id="{3D1A9E0E-01FC-479B-8C22-7C67BAB0EA61}" type="slidenum">
               <a:rPr lang="en-US" smtClean="0"/>
+              <a:pPr/>
               <a:t>‹#›</a:t>
             </a:fld>
             <a:endParaRPr lang="en-US"/>
@@ -1937,7 +1955,8 @@
           <a:p>
             <a:fld id="{317AB7BE-5419-40D2-978B-E265E72EA34A}" type="datetimeFigureOut">
               <a:rPr lang="en-US" smtClean="0"/>
-              <a:t>10/12/2015</a:t>
+              <a:pPr/>
+              <a:t>10/15/2015</a:t>
             </a:fld>
             <a:endParaRPr lang="en-US"/>
           </a:p>
@@ -1979,6 +1998,7 @@
           <a:p>
             <a:fld id="{3D1A9E0E-01FC-479B-8C22-7C67BAB0EA61}" type="slidenum">
               <a:rPr lang="en-US" smtClean="0"/>
+              <a:pPr/>
               <a:t>‹#›</a:t>
             </a:fld>
             <a:endParaRPr lang="en-US"/>
@@ -2209,7 +2229,8 @@
           <a:p>
             <a:fld id="{317AB7BE-5419-40D2-978B-E265E72EA34A}" type="datetimeFigureOut">
               <a:rPr lang="en-US" smtClean="0"/>
-              <a:t>10/12/2015</a:t>
+              <a:pPr/>
+              <a:t>10/15/2015</a:t>
             </a:fld>
             <a:endParaRPr lang="en-US"/>
           </a:p>
@@ -2251,6 +2272,7 @@
           <a:p>
             <a:fld id="{3D1A9E0E-01FC-479B-8C22-7C67BAB0EA61}" type="slidenum">
               <a:rPr lang="en-US" smtClean="0"/>
+              <a:pPr/>
               <a:t>‹#›</a:t>
             </a:fld>
             <a:endParaRPr lang="en-US"/>
@@ -2457,7 +2479,8 @@
           <a:p>
             <a:fld id="{317AB7BE-5419-40D2-978B-E265E72EA34A}" type="datetimeFigureOut">
               <a:rPr lang="en-US" smtClean="0"/>
-              <a:t>10/12/2015</a:t>
+              <a:pPr/>
+              <a:t>10/15/2015</a:t>
             </a:fld>
             <a:endParaRPr lang="en-US"/>
           </a:p>
@@ -2499,6 +2522,7 @@
           <a:p>
             <a:fld id="{3D1A9E0E-01FC-479B-8C22-7C67BAB0EA61}" type="slidenum">
               <a:rPr lang="en-US" smtClean="0"/>
+              <a:pPr/>
               <a:t>‹#›</a:t>
             </a:fld>
             <a:endParaRPr lang="en-US"/>
@@ -2665,7 +2689,8 @@
           <a:p>
             <a:fld id="{317AB7BE-5419-40D2-978B-E265E72EA34A}" type="datetimeFigureOut">
               <a:rPr lang="en-US" smtClean="0"/>
-              <a:t>10/12/2015</a:t>
+              <a:pPr/>
+              <a:t>10/15/2015</a:t>
             </a:fld>
             <a:endParaRPr lang="en-US"/>
           </a:p>
@@ -2743,6 +2768,7 @@
           <a:p>
             <a:fld id="{3D1A9E0E-01FC-479B-8C22-7C67BAB0EA61}" type="slidenum">
               <a:rPr lang="en-US" smtClean="0"/>
+              <a:pPr/>
               <a:t>‹#›</a:t>
             </a:fld>
             <a:endParaRPr lang="en-US"/>
@@ -4145,6 +4171,3672 @@
 </p:sld>
 </file>
 
+<file path=ppt/slides/slide2.xml><?xml version="1.0" encoding="utf-8"?>
+<p:sld xmlns:a="http://schemas.openxmlformats.org/drawingml/2006/main" xmlns:r="http://schemas.openxmlformats.org/officeDocument/2006/relationships" xmlns:p="http://schemas.openxmlformats.org/presentationml/2006/main">
+  <p:cSld>
+    <p:spTree>
+      <p:nvGrpSpPr>
+        <p:cNvPr id="1" name=""/>
+        <p:cNvGrpSpPr/>
+        <p:nvPr/>
+      </p:nvGrpSpPr>
+      <p:grpSpPr>
+        <a:xfrm>
+          <a:off x="0" y="0"/>
+          <a:ext cx="0" cy="0"/>
+          <a:chOff x="0" y="0"/>
+          <a:chExt cx="0" cy="0"/>
+        </a:xfrm>
+      </p:grpSpPr>
+      <p:sp>
+        <p:nvSpPr>
+          <p:cNvPr id="2" name="Title 1"/>
+          <p:cNvSpPr>
+            <a:spLocks noGrp="1"/>
+          </p:cNvSpPr>
+          <p:nvPr>
+            <p:ph type="title"/>
+          </p:nvPr>
+        </p:nvSpPr>
+        <p:spPr>
+          <a:xfrm>
+            <a:off x="457200" y="152400"/>
+            <a:ext cx="8229600" cy="334962"/>
+          </a:xfrm>
+        </p:spPr>
+        <p:txBody>
+          <a:bodyPr>
+            <a:noAutofit/>
+          </a:bodyPr>
+          <a:lstStyle/>
+          <a:p>
+            <a:r>
+              <a:rPr lang="en-US" sz="2400" dirty="0" smtClean="0">
+                <a:latin typeface="Arial" pitchFamily="34" charset="0"/>
+                <a:cs typeface="Arial" pitchFamily="34" charset="0"/>
+              </a:rPr>
+              <a:t>Sample Moving Rainbow Program</a:t>
+            </a:r>
+            <a:endParaRPr lang="en-US" sz="2400" dirty="0">
+              <a:latin typeface="Arial" pitchFamily="34" charset="0"/>
+              <a:cs typeface="Arial" pitchFamily="34" charset="0"/>
+            </a:endParaRPr>
+          </a:p>
+        </p:txBody>
+      </p:sp>
+      <p:sp>
+        <p:nvSpPr>
+          <p:cNvPr id="3" name="Content Placeholder 2"/>
+          <p:cNvSpPr>
+            <a:spLocks noGrp="1"/>
+          </p:cNvSpPr>
+          <p:nvPr>
+            <p:ph idx="1"/>
+          </p:nvPr>
+        </p:nvSpPr>
+        <p:spPr>
+          <a:xfrm>
+            <a:off x="304800" y="533400"/>
+            <a:ext cx="8229600" cy="6172200"/>
+          </a:xfrm>
+        </p:spPr>
+        <p:txBody>
+          <a:bodyPr>
+            <a:noAutofit/>
+          </a:bodyPr>
+          <a:lstStyle/>
+          <a:p>
+            <a:pPr>
+              <a:buNone/>
+            </a:pPr>
+            <a:r>
+              <a:rPr lang="en-US" sz="1200" dirty="0" smtClean="0">
+                <a:solidFill>
+                  <a:srgbClr val="003264"/>
+                </a:solidFill>
+              </a:rPr>
+              <a:t>#include &lt;Adafruit_NeoPixel.h</a:t>
+            </a:r>
+            <a:r>
+              <a:rPr lang="en-US" sz="1200" dirty="0" smtClean="0">
+                <a:solidFill>
+                  <a:srgbClr val="003264"/>
+                </a:solidFill>
+              </a:rPr>
+              <a:t>&gt;</a:t>
+            </a:r>
+            <a:endParaRPr lang="en-US" sz="1200" dirty="0" smtClean="0">
+              <a:solidFill>
+                <a:srgbClr val="000000"/>
+              </a:solidFill>
+            </a:endParaRPr>
+          </a:p>
+          <a:p>
+            <a:pPr>
+              <a:buNone/>
+            </a:pPr>
+            <a:r>
+              <a:rPr lang="en-US" sz="1200" dirty="0" smtClean="0">
+                <a:solidFill>
+                  <a:srgbClr val="003264"/>
+                </a:solidFill>
+              </a:rPr>
+              <a:t>#</a:t>
+            </a:r>
+            <a:r>
+              <a:rPr lang="en-US" sz="1200" dirty="0" smtClean="0">
+                <a:solidFill>
+                  <a:srgbClr val="003264"/>
+                </a:solidFill>
+              </a:rPr>
+              <a:t>define LEDPIN 12 </a:t>
+            </a:r>
+            <a:r>
+              <a:rPr lang="en-US" sz="1200" b="1" dirty="0" smtClean="0">
+                <a:solidFill>
+                  <a:srgbClr val="006648"/>
+                </a:solidFill>
+              </a:rPr>
+              <a:t>// Connect the yellow data from the LED strip to this pin on the Arduino</a:t>
+            </a:r>
+          </a:p>
+          <a:p>
+            <a:pPr>
+              <a:buNone/>
+            </a:pPr>
+            <a:r>
+              <a:rPr lang="en-US" sz="1200" dirty="0" smtClean="0">
+                <a:solidFill>
+                  <a:srgbClr val="003264"/>
+                </a:solidFill>
+              </a:rPr>
+              <a:t>#define </a:t>
+            </a:r>
+            <a:r>
+              <a:rPr lang="en-US" sz="1200" dirty="0" smtClean="0">
+                <a:solidFill>
+                  <a:srgbClr val="003264"/>
+                </a:solidFill>
+              </a:rPr>
+              <a:t>NUMBER_PIXELS 12 </a:t>
+            </a:r>
+            <a:r>
+              <a:rPr lang="en-US" sz="1200" b="1" dirty="0" smtClean="0">
+                <a:solidFill>
+                  <a:srgbClr val="006648"/>
+                </a:solidFill>
+              </a:rPr>
+              <a:t>// the number of pixels in your LED strip</a:t>
+            </a:r>
+          </a:p>
+          <a:p>
+            <a:pPr>
+              <a:buNone/>
+            </a:pPr>
+            <a:r>
+              <a:rPr lang="en-US" sz="1200" b="1" dirty="0" smtClean="0"/>
+              <a:t>Adafruit_NeoPixel </a:t>
+            </a:r>
+            <a:r>
+              <a:rPr lang="en-US" sz="1200" b="1" dirty="0" smtClean="0"/>
+              <a:t>strip = Adafruit_NeoPixel(NUMBER_PIXELS, LEDPIN, NEO_GRB + NEO_KHZ800</a:t>
+            </a:r>
+            <a:r>
+              <a:rPr lang="en-US" sz="1200" b="1" dirty="0" smtClean="0"/>
+              <a:t>);</a:t>
+            </a:r>
+          </a:p>
+          <a:p>
+            <a:pPr>
+              <a:buNone/>
+            </a:pPr>
+            <a:r>
+              <a:rPr lang="en-US" sz="1200" b="1" dirty="0" smtClean="0">
+                <a:solidFill>
+                  <a:srgbClr val="000066"/>
+                </a:solidFill>
+              </a:rPr>
+              <a:t>int</a:t>
+            </a:r>
+            <a:r>
+              <a:rPr lang="en-US" sz="1200" b="1" dirty="0" smtClean="0">
+                <a:solidFill>
+                  <a:srgbClr val="000000"/>
+                </a:solidFill>
+              </a:rPr>
+              <a:t> </a:t>
+            </a:r>
+            <a:r>
+              <a:rPr lang="en-US" sz="1200" b="1" dirty="0" smtClean="0">
+                <a:solidFill>
+                  <a:srgbClr val="000000"/>
+                </a:solidFill>
+              </a:rPr>
+              <a:t>delayTime </a:t>
+            </a:r>
+            <a:r>
+              <a:rPr lang="en-US" sz="1200" b="1" dirty="0" smtClean="0">
+                <a:solidFill>
+                  <a:srgbClr val="640032"/>
+                </a:solidFill>
+              </a:rPr>
+              <a:t>=</a:t>
+            </a:r>
+            <a:r>
+              <a:rPr lang="en-US" sz="1200" b="1" dirty="0" smtClean="0">
+                <a:solidFill>
+                  <a:srgbClr val="000000"/>
+                </a:solidFill>
+              </a:rPr>
+              <a:t> </a:t>
+            </a:r>
+            <a:r>
+              <a:rPr lang="en-US" sz="1200" b="1" dirty="0" smtClean="0">
+                <a:solidFill>
+                  <a:srgbClr val="000096"/>
+                </a:solidFill>
+              </a:rPr>
+              <a:t>100</a:t>
+            </a:r>
+            <a:r>
+              <a:rPr lang="en-US" sz="1200" b="1" dirty="0" smtClean="0">
+                <a:solidFill>
+                  <a:srgbClr val="640032"/>
+                </a:solidFill>
+              </a:rPr>
+              <a:t>;</a:t>
+            </a:r>
+            <a:r>
+              <a:rPr lang="en-US" sz="1200" b="1" dirty="0" smtClean="0">
+                <a:solidFill>
+                  <a:srgbClr val="000000"/>
+                </a:solidFill>
+              </a:rPr>
+              <a:t> </a:t>
+            </a:r>
+            <a:r>
+              <a:rPr lang="en-US" sz="1200" b="1" dirty="0" smtClean="0">
+                <a:solidFill>
+                  <a:srgbClr val="006648"/>
+                </a:solidFill>
+              </a:rPr>
+              <a:t>// 100 milliseconds = </a:t>
+            </a:r>
+            <a:r>
+              <a:rPr lang="en-US" sz="1200" b="1" dirty="0" smtClean="0">
+                <a:solidFill>
+                  <a:srgbClr val="006648"/>
+                </a:solidFill>
+              </a:rPr>
+              <a:t>1/10 of a second</a:t>
+            </a:r>
+            <a:r>
+              <a:rPr lang="en-US" sz="1200" b="1" dirty="0" smtClean="0">
+                <a:solidFill>
+                  <a:srgbClr val="000000"/>
+                </a:solidFill>
+              </a:rPr>
+              <a:t/>
+            </a:r>
+            <a:br>
+              <a:rPr lang="en-US" sz="1200" b="1" dirty="0" smtClean="0">
+                <a:solidFill>
+                  <a:srgbClr val="000000"/>
+                </a:solidFill>
+              </a:rPr>
+            </a:br>
+            <a:endParaRPr lang="en-US" sz="1200" b="1" dirty="0" smtClean="0">
+              <a:solidFill>
+                <a:srgbClr val="000000"/>
+              </a:solidFill>
+            </a:endParaRPr>
+          </a:p>
+          <a:p>
+            <a:pPr>
+              <a:buNone/>
+            </a:pPr>
+            <a:r>
+              <a:rPr lang="en-US" sz="1200" b="1" dirty="0" smtClean="0">
+                <a:solidFill>
+                  <a:srgbClr val="000066"/>
+                </a:solidFill>
+              </a:rPr>
+              <a:t>void</a:t>
+            </a:r>
+            <a:r>
+              <a:rPr lang="en-US" sz="1200" b="1" dirty="0" smtClean="0">
+                <a:solidFill>
+                  <a:srgbClr val="000000"/>
+                </a:solidFill>
+              </a:rPr>
+              <a:t> </a:t>
+            </a:r>
+            <a:r>
+              <a:rPr lang="en-US" sz="1200" b="1" dirty="0" smtClean="0">
+                <a:solidFill>
+                  <a:srgbClr val="000000"/>
+                </a:solidFill>
+              </a:rPr>
+              <a:t>setup</a:t>
+            </a:r>
+            <a:r>
+              <a:rPr lang="en-US" sz="1200" b="1" dirty="0" smtClean="0">
+                <a:solidFill>
+                  <a:srgbClr val="960000"/>
+                </a:solidFill>
+              </a:rPr>
+              <a:t>()</a:t>
+            </a:r>
+            <a:r>
+              <a:rPr lang="en-US" sz="1200" b="1" dirty="0" smtClean="0">
+                <a:solidFill>
+                  <a:srgbClr val="000000"/>
+                </a:solidFill>
+              </a:rPr>
+              <a:t> </a:t>
+            </a:r>
+            <a:r>
+              <a:rPr lang="en-US" sz="1200" b="1" dirty="0" smtClean="0">
+                <a:solidFill>
+                  <a:srgbClr val="960000"/>
+                </a:solidFill>
+              </a:rPr>
+              <a:t>{</a:t>
+            </a:r>
+            <a:r>
+              <a:rPr lang="en-US" sz="1200" b="1" dirty="0" smtClean="0">
+                <a:solidFill>
+                  <a:srgbClr val="000000"/>
+                </a:solidFill>
+              </a:rPr>
+              <a:t/>
+            </a:r>
+            <a:br>
+              <a:rPr lang="en-US" sz="1200" b="1" dirty="0" smtClean="0">
+                <a:solidFill>
+                  <a:srgbClr val="000000"/>
+                </a:solidFill>
+              </a:rPr>
+            </a:br>
+            <a:r>
+              <a:rPr lang="en-US" sz="1200" b="1" dirty="0" smtClean="0">
+                <a:solidFill>
+                  <a:srgbClr val="000000"/>
+                </a:solidFill>
+              </a:rPr>
+              <a:t>  strip</a:t>
+            </a:r>
+            <a:r>
+              <a:rPr lang="en-US" sz="1200" b="1" dirty="0" smtClean="0">
+                <a:solidFill>
+                  <a:srgbClr val="640032"/>
+                </a:solidFill>
+              </a:rPr>
+              <a:t>.</a:t>
+            </a:r>
+            <a:r>
+              <a:rPr lang="en-US" sz="1200" b="1" dirty="0" smtClean="0">
+                <a:solidFill>
+                  <a:srgbClr val="000000"/>
+                </a:solidFill>
+              </a:rPr>
+              <a:t>begin</a:t>
+            </a:r>
+            <a:r>
+              <a:rPr lang="en-US" sz="1200" b="1" dirty="0" smtClean="0">
+                <a:solidFill>
+                  <a:srgbClr val="960000"/>
+                </a:solidFill>
+              </a:rPr>
+              <a:t>()</a:t>
+            </a:r>
+            <a:r>
+              <a:rPr lang="en-US" sz="1200" b="1" dirty="0" smtClean="0">
+                <a:solidFill>
+                  <a:srgbClr val="640032"/>
+                </a:solidFill>
+              </a:rPr>
+              <a:t>;</a:t>
+            </a:r>
+            <a:r>
+              <a:rPr lang="en-US" sz="1200" b="1" dirty="0" smtClean="0">
+                <a:solidFill>
+                  <a:srgbClr val="000000"/>
+                </a:solidFill>
+              </a:rPr>
+              <a:t> </a:t>
+            </a:r>
+            <a:r>
+              <a:rPr lang="en-US" sz="1200" b="1" dirty="0" smtClean="0">
+                <a:solidFill>
+                  <a:srgbClr val="006648"/>
+                </a:solidFill>
+              </a:rPr>
+              <a:t>// initialize the </a:t>
+            </a:r>
+            <a:r>
+              <a:rPr lang="en-US" sz="1200" b="1" dirty="0" smtClean="0">
+                <a:solidFill>
+                  <a:srgbClr val="006648"/>
+                </a:solidFill>
+              </a:rPr>
+              <a:t>strip</a:t>
+            </a:r>
+            <a:endParaRPr lang="en-US" sz="1200" b="1" dirty="0" smtClean="0">
+              <a:solidFill>
+                <a:srgbClr val="000000"/>
+              </a:solidFill>
+            </a:endParaRPr>
+          </a:p>
+          <a:p>
+            <a:pPr>
+              <a:buNone/>
+            </a:pPr>
+            <a:r>
+              <a:rPr lang="en-US" sz="1200" b="1" dirty="0" smtClean="0">
+                <a:solidFill>
+                  <a:srgbClr val="960000"/>
+                </a:solidFill>
+              </a:rPr>
+              <a:t>}</a:t>
+            </a:r>
+            <a:endParaRPr lang="en-US" sz="1200" b="1" dirty="0" smtClean="0">
+              <a:solidFill>
+                <a:srgbClr val="000000"/>
+              </a:solidFill>
+            </a:endParaRPr>
+          </a:p>
+          <a:p>
+            <a:pPr>
+              <a:buNone/>
+            </a:pPr>
+            <a:endParaRPr lang="en-US" sz="1200" b="1" dirty="0" smtClean="0">
+              <a:solidFill>
+                <a:srgbClr val="000000"/>
+              </a:solidFill>
+            </a:endParaRPr>
+          </a:p>
+          <a:p>
+            <a:pPr>
+              <a:buNone/>
+            </a:pPr>
+            <a:r>
+              <a:rPr lang="en-US" sz="1200" b="1" dirty="0" smtClean="0">
+                <a:solidFill>
+                  <a:srgbClr val="000066"/>
+                </a:solidFill>
+              </a:rPr>
+              <a:t>void</a:t>
+            </a:r>
+            <a:r>
+              <a:rPr lang="en-US" sz="1200" b="1" dirty="0" smtClean="0">
+                <a:solidFill>
+                  <a:srgbClr val="000000"/>
+                </a:solidFill>
+              </a:rPr>
+              <a:t> </a:t>
+            </a:r>
+            <a:r>
+              <a:rPr lang="en-US" sz="1200" b="1" dirty="0" smtClean="0">
+                <a:solidFill>
+                  <a:srgbClr val="000000"/>
+                </a:solidFill>
+              </a:rPr>
+              <a:t>loop</a:t>
+            </a:r>
+            <a:r>
+              <a:rPr lang="en-US" sz="1200" b="1" dirty="0" smtClean="0">
+                <a:solidFill>
+                  <a:srgbClr val="960000"/>
+                </a:solidFill>
+              </a:rPr>
+              <a:t>()</a:t>
+            </a:r>
+            <a:r>
+              <a:rPr lang="en-US" sz="1200" b="1" dirty="0" smtClean="0">
+                <a:solidFill>
+                  <a:srgbClr val="000000"/>
+                </a:solidFill>
+              </a:rPr>
+              <a:t> </a:t>
+            </a:r>
+            <a:r>
+              <a:rPr lang="en-US" sz="1200" b="1" dirty="0" smtClean="0">
+                <a:solidFill>
+                  <a:srgbClr val="960000"/>
+                </a:solidFill>
+              </a:rPr>
+              <a:t>{</a:t>
+            </a:r>
+            <a:r>
+              <a:rPr lang="en-US" sz="1200" b="1" dirty="0" smtClean="0">
+                <a:solidFill>
+                  <a:srgbClr val="000000"/>
+                </a:solidFill>
+              </a:rPr>
+              <a:t/>
+            </a:r>
+            <a:br>
+              <a:rPr lang="en-US" sz="1200" b="1" dirty="0" smtClean="0">
+                <a:solidFill>
+                  <a:srgbClr val="000000"/>
+                </a:solidFill>
+              </a:rPr>
+            </a:br>
+            <a:r>
+              <a:rPr lang="en-US" sz="1200" b="1" dirty="0" smtClean="0">
+                <a:solidFill>
+                  <a:srgbClr val="000000"/>
+                </a:solidFill>
+              </a:rPr>
+              <a:t>  </a:t>
+            </a:r>
+            <a:r>
+              <a:rPr lang="en-US" sz="1200" b="1" dirty="0" smtClean="0">
+                <a:solidFill>
+                  <a:srgbClr val="000066"/>
+                </a:solidFill>
+              </a:rPr>
+              <a:t>for</a:t>
+            </a:r>
+            <a:r>
+              <a:rPr lang="en-US" sz="1200" b="1" dirty="0" smtClean="0">
+                <a:solidFill>
+                  <a:srgbClr val="000000"/>
+                </a:solidFill>
+              </a:rPr>
+              <a:t> </a:t>
+            </a:r>
+            <a:r>
+              <a:rPr lang="en-US" sz="1200" b="1" dirty="0" smtClean="0">
+                <a:solidFill>
+                  <a:srgbClr val="960000"/>
+                </a:solidFill>
+              </a:rPr>
+              <a:t>(</a:t>
+            </a:r>
+            <a:r>
+              <a:rPr lang="en-US" sz="1200" b="1" dirty="0" smtClean="0">
+                <a:solidFill>
+                  <a:srgbClr val="000066"/>
+                </a:solidFill>
+              </a:rPr>
+              <a:t>int</a:t>
+            </a:r>
+            <a:r>
+              <a:rPr lang="en-US" sz="1200" b="1" dirty="0" smtClean="0">
+                <a:solidFill>
+                  <a:srgbClr val="000000"/>
+                </a:solidFill>
+              </a:rPr>
+              <a:t> </a:t>
+            </a:r>
+            <a:r>
+              <a:rPr lang="en-US" sz="1200" b="1" dirty="0" err="1" smtClean="0">
+                <a:solidFill>
+                  <a:srgbClr val="000000"/>
+                </a:solidFill>
+              </a:rPr>
+              <a:t>i</a:t>
+            </a:r>
+            <a:r>
+              <a:rPr lang="en-US" sz="1200" b="1" dirty="0" smtClean="0">
+                <a:solidFill>
+                  <a:srgbClr val="640032"/>
+                </a:solidFill>
+              </a:rPr>
+              <a:t>=</a:t>
+            </a:r>
+            <a:r>
+              <a:rPr lang="en-US" sz="1200" b="1" dirty="0" smtClean="0">
+                <a:solidFill>
+                  <a:srgbClr val="000096"/>
+                </a:solidFill>
+              </a:rPr>
+              <a:t>0</a:t>
+            </a:r>
+            <a:r>
+              <a:rPr lang="en-US" sz="1200" b="1" dirty="0" smtClean="0">
+                <a:solidFill>
+                  <a:srgbClr val="640032"/>
+                </a:solidFill>
+              </a:rPr>
+              <a:t>;</a:t>
+            </a:r>
+            <a:r>
+              <a:rPr lang="en-US" sz="1200" b="1" dirty="0" smtClean="0">
+                <a:solidFill>
+                  <a:srgbClr val="000000"/>
+                </a:solidFill>
+              </a:rPr>
+              <a:t> </a:t>
+            </a:r>
+            <a:r>
+              <a:rPr lang="en-US" sz="1200" b="1" dirty="0" err="1" smtClean="0">
+                <a:solidFill>
+                  <a:srgbClr val="000000"/>
+                </a:solidFill>
+              </a:rPr>
+              <a:t>i</a:t>
+            </a:r>
+            <a:r>
+              <a:rPr lang="en-US" sz="1200" b="1" dirty="0" smtClean="0">
+                <a:solidFill>
+                  <a:srgbClr val="640032"/>
+                </a:solidFill>
+              </a:rPr>
+              <a:t>&lt;</a:t>
+            </a:r>
+            <a:r>
+              <a:rPr lang="en-US" sz="1200" b="1" dirty="0" smtClean="0">
+                <a:solidFill>
+                  <a:srgbClr val="000000"/>
+                </a:solidFill>
+              </a:rPr>
+              <a:t>strip</a:t>
+            </a:r>
+            <a:r>
+              <a:rPr lang="en-US" sz="1200" b="1" dirty="0" smtClean="0">
+                <a:solidFill>
+                  <a:srgbClr val="640032"/>
+                </a:solidFill>
+              </a:rPr>
+              <a:t>.</a:t>
+            </a:r>
+            <a:r>
+              <a:rPr lang="en-US" sz="1200" b="1" dirty="0" smtClean="0">
+                <a:solidFill>
+                  <a:srgbClr val="000000"/>
+                </a:solidFill>
+              </a:rPr>
+              <a:t>numPixels</a:t>
+            </a:r>
+            <a:r>
+              <a:rPr lang="en-US" sz="1200" b="1" dirty="0" smtClean="0">
+                <a:solidFill>
+                  <a:srgbClr val="960000"/>
+                </a:solidFill>
+              </a:rPr>
+              <a:t>()</a:t>
+            </a:r>
+            <a:r>
+              <a:rPr lang="en-US" sz="1200" b="1" dirty="0" smtClean="0">
+                <a:solidFill>
+                  <a:srgbClr val="640032"/>
+                </a:solidFill>
+              </a:rPr>
+              <a:t>-</a:t>
+            </a:r>
+            <a:r>
+              <a:rPr lang="en-US" sz="1200" b="1" dirty="0" smtClean="0">
+                <a:solidFill>
+                  <a:srgbClr val="000096"/>
+                </a:solidFill>
+              </a:rPr>
+              <a:t>1</a:t>
+            </a:r>
+            <a:r>
+              <a:rPr lang="en-US" sz="1200" b="1" dirty="0" smtClean="0">
+                <a:solidFill>
+                  <a:srgbClr val="640032"/>
+                </a:solidFill>
+              </a:rPr>
+              <a:t>;</a:t>
+            </a:r>
+            <a:r>
+              <a:rPr lang="en-US" sz="1200" b="1" dirty="0" smtClean="0">
+                <a:solidFill>
+                  <a:srgbClr val="000000"/>
+                </a:solidFill>
+              </a:rPr>
+              <a:t> </a:t>
+            </a:r>
+            <a:r>
+              <a:rPr lang="en-US" sz="1200" b="1" dirty="0" err="1" smtClean="0">
+                <a:solidFill>
+                  <a:srgbClr val="000000"/>
+                </a:solidFill>
+              </a:rPr>
+              <a:t>i</a:t>
+            </a:r>
+            <a:r>
+              <a:rPr lang="en-US" sz="1200" b="1" dirty="0" smtClean="0">
+                <a:solidFill>
+                  <a:srgbClr val="640032"/>
+                </a:solidFill>
+              </a:rPr>
+              <a:t>++</a:t>
+            </a:r>
+            <a:r>
+              <a:rPr lang="en-US" sz="1200" b="1" dirty="0" smtClean="0">
+                <a:solidFill>
+                  <a:srgbClr val="960000"/>
+                </a:solidFill>
+              </a:rPr>
+              <a:t>)</a:t>
+            </a:r>
+            <a:r>
+              <a:rPr lang="en-US" sz="1200" b="1" dirty="0" smtClean="0">
+                <a:solidFill>
+                  <a:srgbClr val="000000"/>
+                </a:solidFill>
+              </a:rPr>
+              <a:t> </a:t>
+            </a:r>
+            <a:r>
+              <a:rPr lang="en-US" sz="1200" b="1" dirty="0" smtClean="0">
+                <a:solidFill>
+                  <a:srgbClr val="960000"/>
+                </a:solidFill>
+              </a:rPr>
+              <a:t>{  </a:t>
+            </a:r>
+            <a:r>
+              <a:rPr lang="en-US" sz="1200" b="1" dirty="0" smtClean="0">
+                <a:solidFill>
+                  <a:srgbClr val="006648"/>
+                </a:solidFill>
+              </a:rPr>
+              <a:t>// a for loop where I goes from 0 to 11</a:t>
+            </a:r>
+            <a:r>
+              <a:rPr lang="en-US" sz="1200" b="1" dirty="0" smtClean="0">
+                <a:solidFill>
+                  <a:srgbClr val="000000"/>
+                </a:solidFill>
+              </a:rPr>
+              <a:t/>
+            </a:r>
+            <a:br>
+              <a:rPr lang="en-US" sz="1200" b="1" dirty="0" smtClean="0">
+                <a:solidFill>
+                  <a:srgbClr val="000000"/>
+                </a:solidFill>
+              </a:rPr>
+            </a:br>
+            <a:r>
+              <a:rPr lang="en-US" sz="1200" b="1" dirty="0" smtClean="0">
+                <a:solidFill>
+                  <a:srgbClr val="000000"/>
+                </a:solidFill>
+              </a:rPr>
+              <a:t>   </a:t>
+            </a:r>
+            <a:r>
+              <a:rPr lang="en-US" sz="1200" b="1" dirty="0" smtClean="0">
+                <a:solidFill>
+                  <a:srgbClr val="000000"/>
+                </a:solidFill>
+              </a:rPr>
+              <a:t>  </a:t>
+            </a:r>
+            <a:r>
+              <a:rPr lang="en-US" sz="1200" b="1" dirty="0" smtClean="0">
+                <a:solidFill>
+                  <a:srgbClr val="000000"/>
+                </a:solidFill>
+              </a:rPr>
+              <a:t>rainbow7</a:t>
+            </a:r>
+            <a:r>
+              <a:rPr lang="en-US" sz="1200" b="1" dirty="0" smtClean="0">
+                <a:solidFill>
+                  <a:srgbClr val="960000"/>
+                </a:solidFill>
+              </a:rPr>
+              <a:t>(</a:t>
+            </a:r>
+            <a:r>
+              <a:rPr lang="en-US" sz="1200" b="1" dirty="0" err="1" smtClean="0">
+                <a:solidFill>
+                  <a:srgbClr val="000000"/>
+                </a:solidFill>
+              </a:rPr>
+              <a:t>i</a:t>
+            </a:r>
+            <a:r>
+              <a:rPr lang="en-US" sz="1200" b="1" dirty="0" smtClean="0">
+                <a:solidFill>
+                  <a:srgbClr val="640032"/>
+                </a:solidFill>
+              </a:rPr>
+              <a:t>,</a:t>
+            </a:r>
+            <a:r>
+              <a:rPr lang="en-US" sz="1200" b="1" dirty="0" smtClean="0">
+                <a:solidFill>
+                  <a:srgbClr val="000000"/>
+                </a:solidFill>
+              </a:rPr>
+              <a:t> delayTime</a:t>
+            </a:r>
+            <a:r>
+              <a:rPr lang="en-US" sz="1200" b="1" dirty="0" smtClean="0">
+                <a:solidFill>
+                  <a:srgbClr val="960000"/>
+                </a:solidFill>
+              </a:rPr>
+              <a:t>)</a:t>
+            </a:r>
+            <a:r>
+              <a:rPr lang="en-US" sz="1200" b="1" dirty="0" smtClean="0">
+                <a:solidFill>
+                  <a:srgbClr val="640032"/>
+                </a:solidFill>
+              </a:rPr>
+              <a:t>;</a:t>
+            </a:r>
+            <a:r>
+              <a:rPr lang="en-US" sz="1200" b="1" dirty="0" smtClean="0">
+                <a:solidFill>
+                  <a:srgbClr val="000000"/>
+                </a:solidFill>
+              </a:rPr>
+              <a:t> </a:t>
+            </a:r>
+            <a:r>
+              <a:rPr lang="en-US" sz="1200" b="1" dirty="0" smtClean="0">
+                <a:solidFill>
+                  <a:srgbClr val="006648"/>
+                </a:solidFill>
+              </a:rPr>
+              <a:t>// starting at </a:t>
+            </a:r>
+            <a:r>
+              <a:rPr lang="en-US" sz="1200" b="1" dirty="0" smtClean="0">
+                <a:solidFill>
+                  <a:srgbClr val="006648"/>
+                </a:solidFill>
+              </a:rPr>
+              <a:t>the index, </a:t>
+            </a:r>
+            <a:r>
+              <a:rPr lang="en-US" sz="1200" b="1" dirty="0" err="1" smtClean="0">
+                <a:solidFill>
+                  <a:srgbClr val="006648"/>
+                </a:solidFill>
+              </a:rPr>
+              <a:t>i</a:t>
+            </a:r>
+            <a:r>
+              <a:rPr lang="en-US" sz="1200" b="1" dirty="0" smtClean="0">
+                <a:solidFill>
+                  <a:srgbClr val="006648"/>
+                </a:solidFill>
+              </a:rPr>
+              <a:t>, draw the 7 color </a:t>
+            </a:r>
+            <a:r>
+              <a:rPr lang="en-US" sz="1200" b="1" dirty="0" smtClean="0">
+                <a:solidFill>
+                  <a:srgbClr val="006648"/>
+                </a:solidFill>
+              </a:rPr>
+              <a:t>rainbow pattern and wait the delay time</a:t>
+            </a:r>
+            <a:r>
+              <a:rPr lang="en-US" sz="1200" b="1" dirty="0" smtClean="0">
+                <a:solidFill>
+                  <a:srgbClr val="000000"/>
+                </a:solidFill>
+              </a:rPr>
+              <a:t/>
+            </a:r>
+            <a:br>
+              <a:rPr lang="en-US" sz="1200" b="1" dirty="0" smtClean="0">
+                <a:solidFill>
+                  <a:srgbClr val="000000"/>
+                </a:solidFill>
+              </a:rPr>
+            </a:br>
+            <a:r>
+              <a:rPr lang="en-US" sz="1200" b="1" dirty="0" smtClean="0">
+                <a:solidFill>
+                  <a:srgbClr val="000000"/>
+                </a:solidFill>
+              </a:rPr>
+              <a:t>  </a:t>
+            </a:r>
+            <a:r>
+              <a:rPr lang="en-US" sz="1200" b="1" dirty="0" smtClean="0">
+                <a:solidFill>
+                  <a:srgbClr val="960000"/>
+                </a:solidFill>
+              </a:rPr>
+              <a:t>} </a:t>
+            </a:r>
+            <a:r>
+              <a:rPr lang="en-US" sz="1200" b="1" dirty="0" smtClean="0">
+                <a:solidFill>
+                  <a:srgbClr val="006648"/>
+                </a:solidFill>
+              </a:rPr>
+              <a:t>// each </a:t>
+            </a:r>
+            <a:r>
+              <a:rPr lang="en-US" sz="1200" b="1" dirty="0" smtClean="0">
+                <a:solidFill>
+                  <a:srgbClr val="006648"/>
+                </a:solidFill>
+              </a:rPr>
+              <a:t>redraws the rainbow </a:t>
+            </a:r>
+            <a:r>
+              <a:rPr lang="en-US" sz="1200" b="1" dirty="0" smtClean="0">
+                <a:solidFill>
+                  <a:srgbClr val="006648"/>
+                </a:solidFill>
+              </a:rPr>
+              <a:t>over one </a:t>
+            </a:r>
+            <a:r>
+              <a:rPr lang="en-US" sz="1200" b="1" dirty="0" smtClean="0">
+                <a:solidFill>
+                  <a:srgbClr val="006648"/>
+                </a:solidFill>
+              </a:rPr>
+              <a:t>pixel</a:t>
+            </a:r>
+            <a:endParaRPr lang="en-US" sz="1200" b="1" dirty="0" smtClean="0">
+              <a:solidFill>
+                <a:srgbClr val="006648"/>
+              </a:solidFill>
+            </a:endParaRPr>
+          </a:p>
+          <a:p>
+            <a:pPr>
+              <a:buNone/>
+            </a:pPr>
+            <a:r>
+              <a:rPr lang="en-US" sz="1200" b="1" dirty="0" smtClean="0">
+                <a:solidFill>
+                  <a:srgbClr val="960000"/>
+                </a:solidFill>
+              </a:rPr>
+              <a:t>}</a:t>
+            </a:r>
+            <a:endParaRPr lang="en-US" sz="1200" b="1" dirty="0" smtClean="0">
+              <a:solidFill>
+                <a:srgbClr val="000000"/>
+              </a:solidFill>
+            </a:endParaRPr>
+          </a:p>
+          <a:p>
+            <a:pPr>
+              <a:buNone/>
+            </a:pPr>
+            <a:r>
+              <a:rPr lang="en-US" sz="1200" b="1" dirty="0" smtClean="0">
+                <a:solidFill>
+                  <a:srgbClr val="006648"/>
+                </a:solidFill>
+              </a:rPr>
+              <a:t>// a function that draws a </a:t>
+            </a:r>
+            <a:r>
+              <a:rPr lang="en-US" sz="1200" b="1" dirty="0" smtClean="0">
+                <a:solidFill>
+                  <a:srgbClr val="006648"/>
+                </a:solidFill>
+              </a:rPr>
+              <a:t>seven segment rainbow with red on the highest </a:t>
+            </a:r>
+            <a:r>
+              <a:rPr lang="en-US" sz="1200" b="1" dirty="0" smtClean="0">
+                <a:solidFill>
+                  <a:srgbClr val="006648"/>
+                </a:solidFill>
+              </a:rPr>
+              <a:t>pixel</a:t>
+            </a:r>
+            <a:endParaRPr lang="en-US" sz="1200" b="1" dirty="0" smtClean="0">
+              <a:solidFill>
+                <a:srgbClr val="000000"/>
+              </a:solidFill>
+            </a:endParaRPr>
+          </a:p>
+          <a:p>
+            <a:pPr>
+              <a:buNone/>
+            </a:pPr>
+            <a:r>
+              <a:rPr lang="en-US" sz="1200" b="1" dirty="0" smtClean="0">
+                <a:solidFill>
+                  <a:srgbClr val="000066"/>
+                </a:solidFill>
+              </a:rPr>
+              <a:t>void</a:t>
+            </a:r>
+            <a:r>
+              <a:rPr lang="en-US" sz="1200" b="1" dirty="0" smtClean="0">
+                <a:solidFill>
+                  <a:srgbClr val="000000"/>
+                </a:solidFill>
+              </a:rPr>
+              <a:t> </a:t>
+            </a:r>
+            <a:r>
+              <a:rPr lang="en-US" sz="1200" b="1" dirty="0" smtClean="0">
+                <a:solidFill>
+                  <a:srgbClr val="000000"/>
+                </a:solidFill>
+              </a:rPr>
+              <a:t>rainbow7</a:t>
+            </a:r>
+            <a:r>
+              <a:rPr lang="en-US" sz="1200" b="1" dirty="0" smtClean="0">
+                <a:solidFill>
+                  <a:srgbClr val="960000"/>
+                </a:solidFill>
+              </a:rPr>
+              <a:t>(</a:t>
+            </a:r>
+            <a:r>
+              <a:rPr lang="en-US" sz="1200" b="1" dirty="0" smtClean="0">
+                <a:solidFill>
+                  <a:srgbClr val="000000"/>
+                </a:solidFill>
+              </a:rPr>
+              <a:t>uint16_t </a:t>
+            </a:r>
+            <a:r>
+              <a:rPr lang="en-US" sz="1200" b="1" dirty="0" err="1" smtClean="0">
+                <a:solidFill>
+                  <a:srgbClr val="000000"/>
+                </a:solidFill>
+              </a:rPr>
+              <a:t>i</a:t>
+            </a:r>
+            <a:r>
+              <a:rPr lang="en-US" sz="1200" b="1" dirty="0" smtClean="0">
+                <a:solidFill>
+                  <a:srgbClr val="640032"/>
+                </a:solidFill>
+              </a:rPr>
+              <a:t>,</a:t>
+            </a:r>
+            <a:r>
+              <a:rPr lang="en-US" sz="1200" b="1" dirty="0" smtClean="0">
+                <a:solidFill>
+                  <a:srgbClr val="000000"/>
+                </a:solidFill>
+              </a:rPr>
+              <a:t> uint16_t wait</a:t>
+            </a:r>
+            <a:r>
+              <a:rPr lang="en-US" sz="1200" b="1" dirty="0" smtClean="0">
+                <a:solidFill>
+                  <a:srgbClr val="960000"/>
+                </a:solidFill>
+              </a:rPr>
+              <a:t>)</a:t>
+            </a:r>
+            <a:r>
+              <a:rPr lang="en-US" sz="1200" b="1" dirty="0" smtClean="0">
+                <a:solidFill>
+                  <a:srgbClr val="000000"/>
+                </a:solidFill>
+              </a:rPr>
+              <a:t> </a:t>
+            </a:r>
+            <a:r>
+              <a:rPr lang="en-US" sz="1200" b="1" dirty="0" smtClean="0">
+                <a:solidFill>
+                  <a:srgbClr val="960000"/>
+                </a:solidFill>
+              </a:rPr>
+              <a:t>{</a:t>
+            </a:r>
+            <a:r>
+              <a:rPr lang="en-US" sz="1200" b="1" dirty="0" smtClean="0">
+                <a:solidFill>
+                  <a:srgbClr val="000000"/>
+                </a:solidFill>
+              </a:rPr>
+              <a:t/>
+            </a:r>
+            <a:br>
+              <a:rPr lang="en-US" sz="1200" b="1" dirty="0" smtClean="0">
+                <a:solidFill>
+                  <a:srgbClr val="000000"/>
+                </a:solidFill>
+              </a:rPr>
+            </a:br>
+            <a:r>
+              <a:rPr lang="en-US" sz="1200" b="1" dirty="0" smtClean="0">
+                <a:solidFill>
+                  <a:srgbClr val="000000"/>
+                </a:solidFill>
+              </a:rPr>
+              <a:t>    </a:t>
+            </a:r>
+            <a:r>
+              <a:rPr lang="en-US" sz="1200" b="1" dirty="0" smtClean="0">
+                <a:solidFill>
+                  <a:srgbClr val="000066"/>
+                </a:solidFill>
+              </a:rPr>
+              <a:t>int</a:t>
+            </a:r>
+            <a:r>
+              <a:rPr lang="en-US" sz="1200" b="1" dirty="0" smtClean="0">
+                <a:solidFill>
+                  <a:srgbClr val="000000"/>
+                </a:solidFill>
+              </a:rPr>
+              <a:t> </a:t>
+            </a:r>
+            <a:r>
+              <a:rPr lang="en-US" sz="1200" b="1" dirty="0" err="1" smtClean="0">
+                <a:solidFill>
+                  <a:srgbClr val="000000"/>
+                </a:solidFill>
+              </a:rPr>
+              <a:t>np</a:t>
+            </a:r>
+            <a:r>
+              <a:rPr lang="en-US" sz="1200" b="1" dirty="0" smtClean="0">
+                <a:solidFill>
+                  <a:srgbClr val="000000"/>
+                </a:solidFill>
+              </a:rPr>
+              <a:t> </a:t>
+            </a:r>
+            <a:r>
+              <a:rPr lang="en-US" sz="1200" b="1" dirty="0" smtClean="0">
+                <a:solidFill>
+                  <a:srgbClr val="640032"/>
+                </a:solidFill>
+              </a:rPr>
+              <a:t>=</a:t>
+            </a:r>
+            <a:r>
+              <a:rPr lang="en-US" sz="1200" b="1" dirty="0" smtClean="0">
+                <a:solidFill>
+                  <a:srgbClr val="000000"/>
+                </a:solidFill>
+              </a:rPr>
+              <a:t> strip</a:t>
+            </a:r>
+            <a:r>
+              <a:rPr lang="en-US" sz="1200" b="1" dirty="0" smtClean="0">
+                <a:solidFill>
+                  <a:srgbClr val="640032"/>
+                </a:solidFill>
+              </a:rPr>
+              <a:t>.</a:t>
+            </a:r>
+            <a:r>
+              <a:rPr lang="en-US" sz="1200" b="1" dirty="0" smtClean="0">
+                <a:solidFill>
+                  <a:srgbClr val="000000"/>
+                </a:solidFill>
+              </a:rPr>
+              <a:t>numPixels</a:t>
+            </a:r>
+            <a:r>
+              <a:rPr lang="en-US" sz="1200" b="1" dirty="0" smtClean="0">
+                <a:solidFill>
+                  <a:srgbClr val="960000"/>
+                </a:solidFill>
+              </a:rPr>
+              <a:t>()</a:t>
+            </a:r>
+            <a:r>
+              <a:rPr lang="en-US" sz="1200" b="1" dirty="0" smtClean="0">
+                <a:solidFill>
+                  <a:srgbClr val="640032"/>
+                </a:solidFill>
+              </a:rPr>
+              <a:t>;</a:t>
+            </a:r>
+            <a:r>
+              <a:rPr lang="en-US" sz="1200" b="1" dirty="0" smtClean="0">
+                <a:solidFill>
+                  <a:srgbClr val="000000"/>
+                </a:solidFill>
+              </a:rPr>
+              <a:t>  </a:t>
+            </a:r>
+            <a:r>
+              <a:rPr lang="en-US" sz="1200" b="1" dirty="0" smtClean="0">
+                <a:solidFill>
+                  <a:srgbClr val="006648"/>
+                </a:solidFill>
+              </a:rPr>
+              <a:t>// we use the modulo function with </a:t>
+            </a:r>
+            <a:r>
+              <a:rPr lang="en-US" sz="1200" b="1" dirty="0" smtClean="0">
+                <a:solidFill>
+                  <a:srgbClr val="006648"/>
+                </a:solidFill>
+              </a:rPr>
+              <a:t>this number to get the "remainder" after a divide by 12</a:t>
+            </a:r>
+            <a:r>
+              <a:rPr lang="en-US" sz="1200" b="1" dirty="0" smtClean="0">
+                <a:solidFill>
+                  <a:srgbClr val="000000"/>
+                </a:solidFill>
+              </a:rPr>
+              <a:t/>
+            </a:r>
+            <a:br>
+              <a:rPr lang="en-US" sz="1200" b="1" dirty="0" smtClean="0">
+                <a:solidFill>
+                  <a:srgbClr val="000000"/>
+                </a:solidFill>
+              </a:rPr>
+            </a:br>
+            <a:r>
+              <a:rPr lang="en-US" sz="1200" b="1" dirty="0" smtClean="0">
+                <a:solidFill>
+                  <a:srgbClr val="000000"/>
+                </a:solidFill>
+              </a:rPr>
+              <a:t>    strip</a:t>
+            </a:r>
+            <a:r>
+              <a:rPr lang="en-US" sz="1200" b="1" dirty="0" smtClean="0">
+                <a:solidFill>
+                  <a:srgbClr val="640032"/>
+                </a:solidFill>
+              </a:rPr>
+              <a:t>.</a:t>
+            </a:r>
+            <a:r>
+              <a:rPr lang="en-US" sz="1200" b="1" dirty="0" smtClean="0">
+                <a:solidFill>
+                  <a:srgbClr val="000000"/>
+                </a:solidFill>
+              </a:rPr>
+              <a:t>setPixelColor</a:t>
+            </a:r>
+            <a:r>
+              <a:rPr lang="en-US" sz="1200" b="1" dirty="0" smtClean="0">
+                <a:solidFill>
+                  <a:srgbClr val="960000"/>
+                </a:solidFill>
+              </a:rPr>
+              <a:t>(</a:t>
+            </a:r>
+            <a:r>
+              <a:rPr lang="en-US" sz="1200" b="1" dirty="0" err="1" smtClean="0">
+                <a:solidFill>
+                  <a:srgbClr val="000000"/>
+                </a:solidFill>
+              </a:rPr>
+              <a:t>i</a:t>
+            </a:r>
+            <a:r>
+              <a:rPr lang="en-US" sz="1200" b="1" dirty="0" smtClean="0">
+                <a:solidFill>
+                  <a:srgbClr val="000000"/>
+                </a:solidFill>
+              </a:rPr>
+              <a:t>     </a:t>
+            </a:r>
+            <a:r>
+              <a:rPr lang="en-US" sz="1200" b="1" dirty="0" smtClean="0">
+                <a:solidFill>
+                  <a:srgbClr val="640032"/>
+                </a:solidFill>
+              </a:rPr>
+              <a:t>%</a:t>
+            </a:r>
+            <a:r>
+              <a:rPr lang="en-US" sz="1200" b="1" dirty="0" smtClean="0">
+                <a:solidFill>
+                  <a:srgbClr val="000000"/>
+                </a:solidFill>
+              </a:rPr>
+              <a:t> </a:t>
+            </a:r>
+            <a:r>
+              <a:rPr lang="en-US" sz="1200" b="1" dirty="0" err="1" smtClean="0">
+                <a:solidFill>
+                  <a:srgbClr val="000000"/>
+                </a:solidFill>
+              </a:rPr>
+              <a:t>np</a:t>
+            </a:r>
+            <a:r>
+              <a:rPr lang="en-US" sz="1200" b="1" dirty="0" smtClean="0">
+                <a:solidFill>
+                  <a:srgbClr val="640032"/>
+                </a:solidFill>
+              </a:rPr>
+              <a:t>,</a:t>
+            </a:r>
+            <a:r>
+              <a:rPr lang="en-US" sz="1200" b="1" dirty="0" smtClean="0">
+                <a:solidFill>
+                  <a:srgbClr val="000000"/>
+                </a:solidFill>
+              </a:rPr>
+              <a:t> </a:t>
+            </a:r>
+            <a:r>
+              <a:rPr lang="en-US" sz="1200" b="1" dirty="0" smtClean="0">
+                <a:solidFill>
+                  <a:srgbClr val="000096"/>
+                </a:solidFill>
+              </a:rPr>
+              <a:t>25</a:t>
+            </a:r>
+            <a:r>
+              <a:rPr lang="en-US" sz="1200" b="1" dirty="0" smtClean="0">
+                <a:solidFill>
+                  <a:srgbClr val="640032"/>
+                </a:solidFill>
+              </a:rPr>
+              <a:t>,</a:t>
+            </a:r>
+            <a:r>
+              <a:rPr lang="en-US" sz="1200" b="1" dirty="0" smtClean="0">
+                <a:solidFill>
+                  <a:srgbClr val="000000"/>
+                </a:solidFill>
+              </a:rPr>
+              <a:t> </a:t>
+            </a:r>
+            <a:r>
+              <a:rPr lang="en-US" sz="1200" b="1" dirty="0" smtClean="0">
+                <a:solidFill>
+                  <a:srgbClr val="000096"/>
+                </a:solidFill>
+              </a:rPr>
+              <a:t>0</a:t>
+            </a:r>
+            <a:r>
+              <a:rPr lang="en-US" sz="1200" b="1" dirty="0" smtClean="0">
+                <a:solidFill>
+                  <a:srgbClr val="640032"/>
+                </a:solidFill>
+              </a:rPr>
+              <a:t>,</a:t>
+            </a:r>
+            <a:r>
+              <a:rPr lang="en-US" sz="1200" b="1" dirty="0" smtClean="0">
+                <a:solidFill>
+                  <a:srgbClr val="000000"/>
+                </a:solidFill>
+              </a:rPr>
+              <a:t> </a:t>
+            </a:r>
+            <a:r>
+              <a:rPr lang="en-US" sz="1200" b="1" dirty="0" smtClean="0">
+                <a:solidFill>
+                  <a:srgbClr val="000096"/>
+                </a:solidFill>
+              </a:rPr>
+              <a:t>25</a:t>
+            </a:r>
+            <a:r>
+              <a:rPr lang="en-US" sz="1200" b="1" dirty="0" smtClean="0">
+                <a:solidFill>
+                  <a:srgbClr val="960000"/>
+                </a:solidFill>
+              </a:rPr>
+              <a:t>)</a:t>
+            </a:r>
+            <a:r>
+              <a:rPr lang="en-US" sz="1200" b="1" dirty="0" smtClean="0">
+                <a:solidFill>
+                  <a:srgbClr val="640032"/>
+                </a:solidFill>
+              </a:rPr>
+              <a:t>;</a:t>
+            </a:r>
+            <a:r>
+              <a:rPr lang="en-US" sz="1200" b="1" dirty="0" smtClean="0">
+                <a:solidFill>
+                  <a:srgbClr val="000000"/>
+                </a:solidFill>
+              </a:rPr>
+              <a:t> </a:t>
+            </a:r>
+            <a:r>
+              <a:rPr lang="en-US" sz="1200" b="1" dirty="0" smtClean="0">
+                <a:solidFill>
+                  <a:srgbClr val="006648"/>
+                </a:solidFill>
+              </a:rPr>
+              <a:t>// </a:t>
+            </a:r>
+            <a:r>
+              <a:rPr lang="en-US" sz="1200" b="1" dirty="0" smtClean="0">
+                <a:solidFill>
+                  <a:srgbClr val="006648"/>
+                </a:solidFill>
+              </a:rPr>
+              <a:t>violet is a bit of red and blue</a:t>
+            </a:r>
+            <a:r>
+              <a:rPr lang="en-US" sz="1200" b="1" dirty="0" smtClean="0">
+                <a:solidFill>
+                  <a:srgbClr val="000000"/>
+                </a:solidFill>
+              </a:rPr>
+              <a:t/>
+            </a:r>
+            <a:br>
+              <a:rPr lang="en-US" sz="1200" b="1" dirty="0" smtClean="0">
+                <a:solidFill>
+                  <a:srgbClr val="000000"/>
+                </a:solidFill>
+              </a:rPr>
+            </a:br>
+            <a:r>
+              <a:rPr lang="en-US" sz="1200" b="1" dirty="0" smtClean="0">
+                <a:solidFill>
+                  <a:srgbClr val="000000"/>
+                </a:solidFill>
+              </a:rPr>
+              <a:t>    strip</a:t>
+            </a:r>
+            <a:r>
+              <a:rPr lang="en-US" sz="1200" b="1" dirty="0" smtClean="0">
+                <a:solidFill>
+                  <a:srgbClr val="640032"/>
+                </a:solidFill>
+              </a:rPr>
+              <a:t>.</a:t>
+            </a:r>
+            <a:r>
+              <a:rPr lang="en-US" sz="1200" b="1" dirty="0" smtClean="0">
+                <a:solidFill>
+                  <a:srgbClr val="000000"/>
+                </a:solidFill>
+              </a:rPr>
+              <a:t>setPixelColor</a:t>
+            </a:r>
+            <a:r>
+              <a:rPr lang="en-US" sz="1200" b="1" dirty="0" smtClean="0">
+                <a:solidFill>
+                  <a:srgbClr val="960000"/>
+                </a:solidFill>
+              </a:rPr>
+              <a:t>((</a:t>
+            </a:r>
+            <a:r>
+              <a:rPr lang="en-US" sz="1200" b="1" dirty="0" smtClean="0">
+                <a:solidFill>
+                  <a:srgbClr val="000000"/>
+                </a:solidFill>
+              </a:rPr>
+              <a:t>i</a:t>
+            </a:r>
+            <a:r>
+              <a:rPr lang="en-US" sz="1200" b="1" dirty="0" smtClean="0">
+                <a:solidFill>
+                  <a:srgbClr val="640032"/>
+                </a:solidFill>
+              </a:rPr>
+              <a:t>+</a:t>
+            </a:r>
+            <a:r>
+              <a:rPr lang="en-US" sz="1200" b="1" dirty="0" smtClean="0">
+                <a:solidFill>
+                  <a:srgbClr val="000096"/>
+                </a:solidFill>
+              </a:rPr>
+              <a:t>1</a:t>
+            </a:r>
+            <a:r>
+              <a:rPr lang="en-US" sz="1200" b="1" dirty="0" smtClean="0">
+                <a:solidFill>
+                  <a:srgbClr val="960000"/>
+                </a:solidFill>
+              </a:rPr>
+              <a:t>)</a:t>
+            </a:r>
+            <a:r>
+              <a:rPr lang="en-US" sz="1200" b="1" dirty="0" smtClean="0">
+                <a:solidFill>
+                  <a:srgbClr val="000000"/>
+                </a:solidFill>
+              </a:rPr>
+              <a:t> </a:t>
+            </a:r>
+            <a:r>
+              <a:rPr lang="en-US" sz="1200" b="1" dirty="0" smtClean="0">
+                <a:solidFill>
+                  <a:srgbClr val="640032"/>
+                </a:solidFill>
+              </a:rPr>
+              <a:t>%</a:t>
+            </a:r>
+            <a:r>
+              <a:rPr lang="en-US" sz="1200" b="1" dirty="0" smtClean="0">
+                <a:solidFill>
+                  <a:srgbClr val="000000"/>
+                </a:solidFill>
+              </a:rPr>
+              <a:t> </a:t>
+            </a:r>
+            <a:r>
+              <a:rPr lang="en-US" sz="1200" b="1" dirty="0" err="1" smtClean="0">
+                <a:solidFill>
+                  <a:srgbClr val="000000"/>
+                </a:solidFill>
+              </a:rPr>
+              <a:t>np</a:t>
+            </a:r>
+            <a:r>
+              <a:rPr lang="en-US" sz="1200" b="1" dirty="0" smtClean="0">
+                <a:solidFill>
+                  <a:srgbClr val="640032"/>
+                </a:solidFill>
+              </a:rPr>
+              <a:t>,</a:t>
+            </a:r>
+            <a:r>
+              <a:rPr lang="en-US" sz="1200" b="1" dirty="0" smtClean="0">
+                <a:solidFill>
+                  <a:srgbClr val="000000"/>
+                </a:solidFill>
+              </a:rPr>
+              <a:t> </a:t>
+            </a:r>
+            <a:r>
+              <a:rPr lang="en-US" sz="1200" b="1" dirty="0" smtClean="0">
+                <a:solidFill>
+                  <a:srgbClr val="000096"/>
+                </a:solidFill>
+              </a:rPr>
+              <a:t>255</a:t>
+            </a:r>
+            <a:r>
+              <a:rPr lang="en-US" sz="1200" b="1" dirty="0" smtClean="0">
+                <a:solidFill>
+                  <a:srgbClr val="640032"/>
+                </a:solidFill>
+              </a:rPr>
+              <a:t>,</a:t>
+            </a:r>
+            <a:r>
+              <a:rPr lang="en-US" sz="1200" b="1" dirty="0" smtClean="0">
+                <a:solidFill>
+                  <a:srgbClr val="000000"/>
+                </a:solidFill>
+              </a:rPr>
+              <a:t> </a:t>
+            </a:r>
+            <a:r>
+              <a:rPr lang="en-US" sz="1200" b="1" dirty="0" smtClean="0">
+                <a:solidFill>
+                  <a:srgbClr val="000096"/>
+                </a:solidFill>
+              </a:rPr>
+              <a:t>0</a:t>
+            </a:r>
+            <a:r>
+              <a:rPr lang="en-US" sz="1200" b="1" dirty="0" smtClean="0">
+                <a:solidFill>
+                  <a:srgbClr val="640032"/>
+                </a:solidFill>
+              </a:rPr>
+              <a:t>,</a:t>
+            </a:r>
+            <a:r>
+              <a:rPr lang="en-US" sz="1200" b="1" dirty="0" smtClean="0">
+                <a:solidFill>
+                  <a:srgbClr val="000000"/>
+                </a:solidFill>
+              </a:rPr>
+              <a:t> </a:t>
+            </a:r>
+            <a:r>
+              <a:rPr lang="en-US" sz="1200" b="1" dirty="0" smtClean="0">
+                <a:solidFill>
+                  <a:srgbClr val="000096"/>
+                </a:solidFill>
+              </a:rPr>
+              <a:t>255</a:t>
+            </a:r>
+            <a:r>
+              <a:rPr lang="en-US" sz="1200" b="1" dirty="0" smtClean="0">
+                <a:solidFill>
+                  <a:srgbClr val="960000"/>
+                </a:solidFill>
+              </a:rPr>
+              <a:t>)</a:t>
+            </a:r>
+            <a:r>
+              <a:rPr lang="en-US" sz="1200" b="1" dirty="0" smtClean="0">
+                <a:solidFill>
+                  <a:srgbClr val="640032"/>
+                </a:solidFill>
+              </a:rPr>
+              <a:t>;</a:t>
+            </a:r>
+            <a:r>
+              <a:rPr lang="en-US" sz="1200" b="1" dirty="0" smtClean="0">
+                <a:solidFill>
+                  <a:srgbClr val="000000"/>
+                </a:solidFill>
+              </a:rPr>
+              <a:t> </a:t>
+            </a:r>
+            <a:r>
+              <a:rPr lang="en-US" sz="1200" b="1" dirty="0" smtClean="0">
+                <a:solidFill>
+                  <a:srgbClr val="006648"/>
+                </a:solidFill>
+              </a:rPr>
+              <a:t>// </a:t>
+            </a:r>
+            <a:r>
+              <a:rPr lang="en-US" sz="1200" b="1" dirty="0" smtClean="0">
+                <a:solidFill>
+                  <a:srgbClr val="006648"/>
+                </a:solidFill>
+              </a:rPr>
+              <a:t>indigo is a LOT of red and blue</a:t>
+            </a:r>
+            <a:r>
+              <a:rPr lang="en-US" sz="1200" b="1" dirty="0" smtClean="0">
+                <a:solidFill>
+                  <a:srgbClr val="000000"/>
+                </a:solidFill>
+              </a:rPr>
+              <a:t/>
+            </a:r>
+            <a:br>
+              <a:rPr lang="en-US" sz="1200" b="1" dirty="0" smtClean="0">
+                <a:solidFill>
+                  <a:srgbClr val="000000"/>
+                </a:solidFill>
+              </a:rPr>
+            </a:br>
+            <a:r>
+              <a:rPr lang="en-US" sz="1200" b="1" dirty="0" smtClean="0">
+                <a:solidFill>
+                  <a:srgbClr val="000000"/>
+                </a:solidFill>
+              </a:rPr>
+              <a:t>    strip</a:t>
+            </a:r>
+            <a:r>
+              <a:rPr lang="en-US" sz="1200" b="1" dirty="0" smtClean="0">
+                <a:solidFill>
+                  <a:srgbClr val="640032"/>
+                </a:solidFill>
+              </a:rPr>
+              <a:t>.</a:t>
+            </a:r>
+            <a:r>
+              <a:rPr lang="en-US" sz="1200" b="1" dirty="0" smtClean="0">
+                <a:solidFill>
+                  <a:srgbClr val="000000"/>
+                </a:solidFill>
+              </a:rPr>
+              <a:t>setPixelColor</a:t>
+            </a:r>
+            <a:r>
+              <a:rPr lang="en-US" sz="1200" b="1" dirty="0" smtClean="0">
+                <a:solidFill>
+                  <a:srgbClr val="960000"/>
+                </a:solidFill>
+              </a:rPr>
+              <a:t>((</a:t>
+            </a:r>
+            <a:r>
+              <a:rPr lang="en-US" sz="1200" b="1" dirty="0" smtClean="0">
+                <a:solidFill>
+                  <a:srgbClr val="000000"/>
+                </a:solidFill>
+              </a:rPr>
+              <a:t>i</a:t>
+            </a:r>
+            <a:r>
+              <a:rPr lang="en-US" sz="1200" b="1" dirty="0" smtClean="0">
+                <a:solidFill>
+                  <a:srgbClr val="640032"/>
+                </a:solidFill>
+              </a:rPr>
+              <a:t>+</a:t>
+            </a:r>
+            <a:r>
+              <a:rPr lang="en-US" sz="1200" b="1" dirty="0" smtClean="0">
+                <a:solidFill>
+                  <a:srgbClr val="000096"/>
+                </a:solidFill>
+              </a:rPr>
+              <a:t>2</a:t>
+            </a:r>
+            <a:r>
+              <a:rPr lang="en-US" sz="1200" b="1" dirty="0" smtClean="0">
+                <a:solidFill>
+                  <a:srgbClr val="960000"/>
+                </a:solidFill>
+              </a:rPr>
+              <a:t>)</a:t>
+            </a:r>
+            <a:r>
+              <a:rPr lang="en-US" sz="1200" b="1" dirty="0" smtClean="0">
+                <a:solidFill>
+                  <a:srgbClr val="000000"/>
+                </a:solidFill>
+              </a:rPr>
+              <a:t> </a:t>
+            </a:r>
+            <a:r>
+              <a:rPr lang="en-US" sz="1200" b="1" dirty="0" smtClean="0">
+                <a:solidFill>
+                  <a:srgbClr val="640032"/>
+                </a:solidFill>
+              </a:rPr>
+              <a:t>%</a:t>
+            </a:r>
+            <a:r>
+              <a:rPr lang="en-US" sz="1200" b="1" dirty="0" smtClean="0">
+                <a:solidFill>
+                  <a:srgbClr val="000000"/>
+                </a:solidFill>
+              </a:rPr>
+              <a:t> </a:t>
+            </a:r>
+            <a:r>
+              <a:rPr lang="en-US" sz="1200" b="1" dirty="0" err="1" smtClean="0">
+                <a:solidFill>
+                  <a:srgbClr val="000000"/>
+                </a:solidFill>
+              </a:rPr>
+              <a:t>np</a:t>
+            </a:r>
+            <a:r>
+              <a:rPr lang="en-US" sz="1200" b="1" dirty="0" smtClean="0">
+                <a:solidFill>
+                  <a:srgbClr val="640032"/>
+                </a:solidFill>
+              </a:rPr>
+              <a:t>,</a:t>
+            </a:r>
+            <a:r>
+              <a:rPr lang="en-US" sz="1200" b="1" dirty="0" smtClean="0">
+                <a:solidFill>
+                  <a:srgbClr val="000000"/>
+                </a:solidFill>
+              </a:rPr>
+              <a:t> </a:t>
+            </a:r>
+            <a:r>
+              <a:rPr lang="en-US" sz="1200" b="1" dirty="0" smtClean="0">
+                <a:solidFill>
+                  <a:srgbClr val="000096"/>
+                </a:solidFill>
+              </a:rPr>
+              <a:t>0</a:t>
+            </a:r>
+            <a:r>
+              <a:rPr lang="en-US" sz="1200" b="1" dirty="0" smtClean="0">
+                <a:solidFill>
+                  <a:srgbClr val="640032"/>
+                </a:solidFill>
+              </a:rPr>
+              <a:t>,</a:t>
+            </a:r>
+            <a:r>
+              <a:rPr lang="en-US" sz="1200" b="1" dirty="0" smtClean="0">
+                <a:solidFill>
+                  <a:srgbClr val="000000"/>
+                </a:solidFill>
+              </a:rPr>
+              <a:t> </a:t>
+            </a:r>
+            <a:r>
+              <a:rPr lang="en-US" sz="1200" b="1" dirty="0" smtClean="0">
+                <a:solidFill>
+                  <a:srgbClr val="000096"/>
+                </a:solidFill>
+              </a:rPr>
+              <a:t>0</a:t>
+            </a:r>
+            <a:r>
+              <a:rPr lang="en-US" sz="1200" b="1" dirty="0" smtClean="0">
+                <a:solidFill>
+                  <a:srgbClr val="640032"/>
+                </a:solidFill>
+              </a:rPr>
+              <a:t>,</a:t>
+            </a:r>
+            <a:r>
+              <a:rPr lang="en-US" sz="1200" b="1" dirty="0" smtClean="0">
+                <a:solidFill>
+                  <a:srgbClr val="000000"/>
+                </a:solidFill>
+              </a:rPr>
+              <a:t> </a:t>
+            </a:r>
+            <a:r>
+              <a:rPr lang="en-US" sz="1200" b="1" dirty="0" smtClean="0">
+                <a:solidFill>
+                  <a:srgbClr val="000096"/>
+                </a:solidFill>
+              </a:rPr>
+              <a:t>150</a:t>
+            </a:r>
+            <a:r>
+              <a:rPr lang="en-US" sz="1200" b="1" dirty="0" smtClean="0">
+                <a:solidFill>
+                  <a:srgbClr val="960000"/>
+                </a:solidFill>
+              </a:rPr>
+              <a:t>)</a:t>
+            </a:r>
+            <a:r>
+              <a:rPr lang="en-US" sz="1200" b="1" dirty="0" smtClean="0">
+                <a:solidFill>
+                  <a:srgbClr val="640032"/>
+                </a:solidFill>
+              </a:rPr>
+              <a:t>;</a:t>
+            </a:r>
+            <a:r>
+              <a:rPr lang="en-US" sz="1200" b="1" dirty="0" smtClean="0">
+                <a:solidFill>
+                  <a:srgbClr val="000000"/>
+                </a:solidFill>
+              </a:rPr>
+              <a:t> </a:t>
+            </a:r>
+            <a:r>
+              <a:rPr lang="en-US" sz="1200" b="1" dirty="0" smtClean="0">
+                <a:solidFill>
+                  <a:srgbClr val="006648"/>
+                </a:solidFill>
+              </a:rPr>
+              <a:t>// blue</a:t>
+            </a:r>
+            <a:r>
+              <a:rPr lang="en-US" sz="1200" b="1" dirty="0" smtClean="0">
+                <a:solidFill>
+                  <a:srgbClr val="000000"/>
+                </a:solidFill>
+              </a:rPr>
+              <a:t/>
+            </a:r>
+            <a:br>
+              <a:rPr lang="en-US" sz="1200" b="1" dirty="0" smtClean="0">
+                <a:solidFill>
+                  <a:srgbClr val="000000"/>
+                </a:solidFill>
+              </a:rPr>
+            </a:br>
+            <a:r>
+              <a:rPr lang="en-US" sz="1200" b="1" dirty="0" smtClean="0">
+                <a:solidFill>
+                  <a:srgbClr val="000000"/>
+                </a:solidFill>
+              </a:rPr>
+              <a:t>    strip</a:t>
+            </a:r>
+            <a:r>
+              <a:rPr lang="en-US" sz="1200" b="1" dirty="0" smtClean="0">
+                <a:solidFill>
+                  <a:srgbClr val="640032"/>
+                </a:solidFill>
+              </a:rPr>
+              <a:t>.</a:t>
+            </a:r>
+            <a:r>
+              <a:rPr lang="en-US" sz="1200" b="1" dirty="0" smtClean="0">
+                <a:solidFill>
+                  <a:srgbClr val="000000"/>
+                </a:solidFill>
+              </a:rPr>
+              <a:t>setPixelColor</a:t>
+            </a:r>
+            <a:r>
+              <a:rPr lang="en-US" sz="1200" b="1" dirty="0" smtClean="0">
+                <a:solidFill>
+                  <a:srgbClr val="960000"/>
+                </a:solidFill>
+              </a:rPr>
+              <a:t>((</a:t>
+            </a:r>
+            <a:r>
+              <a:rPr lang="en-US" sz="1200" b="1" dirty="0" smtClean="0">
+                <a:solidFill>
+                  <a:srgbClr val="000000"/>
+                </a:solidFill>
+              </a:rPr>
+              <a:t>i</a:t>
+            </a:r>
+            <a:r>
+              <a:rPr lang="en-US" sz="1200" b="1" dirty="0" smtClean="0">
+                <a:solidFill>
+                  <a:srgbClr val="640032"/>
+                </a:solidFill>
+              </a:rPr>
+              <a:t>+</a:t>
+            </a:r>
+            <a:r>
+              <a:rPr lang="en-US" sz="1200" b="1" dirty="0" smtClean="0">
+                <a:solidFill>
+                  <a:srgbClr val="000096"/>
+                </a:solidFill>
+              </a:rPr>
+              <a:t>3</a:t>
+            </a:r>
+            <a:r>
+              <a:rPr lang="en-US" sz="1200" b="1" dirty="0" smtClean="0">
+                <a:solidFill>
+                  <a:srgbClr val="960000"/>
+                </a:solidFill>
+              </a:rPr>
+              <a:t>)</a:t>
+            </a:r>
+            <a:r>
+              <a:rPr lang="en-US" sz="1200" b="1" dirty="0" smtClean="0">
+                <a:solidFill>
+                  <a:srgbClr val="000000"/>
+                </a:solidFill>
+              </a:rPr>
+              <a:t> </a:t>
+            </a:r>
+            <a:r>
+              <a:rPr lang="en-US" sz="1200" b="1" dirty="0" smtClean="0">
+                <a:solidFill>
+                  <a:srgbClr val="640032"/>
+                </a:solidFill>
+              </a:rPr>
+              <a:t>%</a:t>
+            </a:r>
+            <a:r>
+              <a:rPr lang="en-US" sz="1200" b="1" dirty="0" smtClean="0">
+                <a:solidFill>
+                  <a:srgbClr val="000000"/>
+                </a:solidFill>
+              </a:rPr>
+              <a:t> </a:t>
+            </a:r>
+            <a:r>
+              <a:rPr lang="en-US" sz="1200" b="1" dirty="0" err="1" smtClean="0">
+                <a:solidFill>
+                  <a:srgbClr val="000000"/>
+                </a:solidFill>
+              </a:rPr>
+              <a:t>np</a:t>
+            </a:r>
+            <a:r>
+              <a:rPr lang="en-US" sz="1200" b="1" dirty="0" smtClean="0">
+                <a:solidFill>
+                  <a:srgbClr val="640032"/>
+                </a:solidFill>
+              </a:rPr>
+              <a:t>,</a:t>
+            </a:r>
+            <a:r>
+              <a:rPr lang="en-US" sz="1200" b="1" dirty="0" smtClean="0">
+                <a:solidFill>
+                  <a:srgbClr val="000000"/>
+                </a:solidFill>
+              </a:rPr>
+              <a:t> </a:t>
+            </a:r>
+            <a:r>
+              <a:rPr lang="en-US" sz="1200" b="1" dirty="0" smtClean="0">
+                <a:solidFill>
+                  <a:srgbClr val="000096"/>
+                </a:solidFill>
+              </a:rPr>
+              <a:t>0</a:t>
+            </a:r>
+            <a:r>
+              <a:rPr lang="en-US" sz="1200" b="1" dirty="0" smtClean="0">
+                <a:solidFill>
+                  <a:srgbClr val="640032"/>
+                </a:solidFill>
+              </a:rPr>
+              <a:t>,</a:t>
+            </a:r>
+            <a:r>
+              <a:rPr lang="en-US" sz="1200" b="1" dirty="0" smtClean="0">
+                <a:solidFill>
+                  <a:srgbClr val="000000"/>
+                </a:solidFill>
+              </a:rPr>
+              <a:t> </a:t>
+            </a:r>
+            <a:r>
+              <a:rPr lang="en-US" sz="1200" b="1" dirty="0" smtClean="0">
+                <a:solidFill>
+                  <a:srgbClr val="000096"/>
+                </a:solidFill>
+              </a:rPr>
+              <a:t>150</a:t>
+            </a:r>
+            <a:r>
+              <a:rPr lang="en-US" sz="1200" b="1" dirty="0" smtClean="0">
+                <a:solidFill>
+                  <a:srgbClr val="640032"/>
+                </a:solidFill>
+              </a:rPr>
+              <a:t>,</a:t>
+            </a:r>
+            <a:r>
+              <a:rPr lang="en-US" sz="1200" b="1" dirty="0" smtClean="0">
+                <a:solidFill>
+                  <a:srgbClr val="000000"/>
+                </a:solidFill>
+              </a:rPr>
+              <a:t> </a:t>
+            </a:r>
+            <a:r>
+              <a:rPr lang="en-US" sz="1200" b="1" dirty="0" smtClean="0">
+                <a:solidFill>
+                  <a:srgbClr val="000096"/>
+                </a:solidFill>
+              </a:rPr>
+              <a:t>0</a:t>
+            </a:r>
+            <a:r>
+              <a:rPr lang="en-US" sz="1200" b="1" dirty="0" smtClean="0">
+                <a:solidFill>
+                  <a:srgbClr val="960000"/>
+                </a:solidFill>
+              </a:rPr>
+              <a:t>)</a:t>
+            </a:r>
+            <a:r>
+              <a:rPr lang="en-US" sz="1200" b="1" dirty="0" smtClean="0">
+                <a:solidFill>
+                  <a:srgbClr val="640032"/>
+                </a:solidFill>
+              </a:rPr>
+              <a:t>;</a:t>
+            </a:r>
+            <a:r>
+              <a:rPr lang="en-US" sz="1200" b="1" dirty="0" smtClean="0">
+                <a:solidFill>
+                  <a:srgbClr val="000000"/>
+                </a:solidFill>
+              </a:rPr>
+              <a:t> </a:t>
+            </a:r>
+            <a:r>
+              <a:rPr lang="en-US" sz="1200" b="1" dirty="0" smtClean="0">
+                <a:solidFill>
+                  <a:srgbClr val="006648"/>
+                </a:solidFill>
+              </a:rPr>
+              <a:t>// green</a:t>
+            </a:r>
+            <a:r>
+              <a:rPr lang="en-US" sz="1200" b="1" dirty="0" smtClean="0">
+                <a:solidFill>
+                  <a:srgbClr val="000000"/>
+                </a:solidFill>
+              </a:rPr>
+              <a:t/>
+            </a:r>
+            <a:br>
+              <a:rPr lang="en-US" sz="1200" b="1" dirty="0" smtClean="0">
+                <a:solidFill>
+                  <a:srgbClr val="000000"/>
+                </a:solidFill>
+              </a:rPr>
+            </a:br>
+            <a:r>
+              <a:rPr lang="en-US" sz="1200" b="1" dirty="0" smtClean="0">
+                <a:solidFill>
+                  <a:srgbClr val="000000"/>
+                </a:solidFill>
+              </a:rPr>
+              <a:t>    strip</a:t>
+            </a:r>
+            <a:r>
+              <a:rPr lang="en-US" sz="1200" b="1" dirty="0" smtClean="0">
+                <a:solidFill>
+                  <a:srgbClr val="640032"/>
+                </a:solidFill>
+              </a:rPr>
+              <a:t>.</a:t>
+            </a:r>
+            <a:r>
+              <a:rPr lang="en-US" sz="1200" b="1" dirty="0" smtClean="0">
+                <a:solidFill>
+                  <a:srgbClr val="000000"/>
+                </a:solidFill>
+              </a:rPr>
+              <a:t>setPixelColor</a:t>
+            </a:r>
+            <a:r>
+              <a:rPr lang="en-US" sz="1200" b="1" dirty="0" smtClean="0">
+                <a:solidFill>
+                  <a:srgbClr val="960000"/>
+                </a:solidFill>
+              </a:rPr>
+              <a:t>((</a:t>
+            </a:r>
+            <a:r>
+              <a:rPr lang="en-US" sz="1200" b="1" dirty="0" smtClean="0">
+                <a:solidFill>
+                  <a:srgbClr val="000000"/>
+                </a:solidFill>
+              </a:rPr>
+              <a:t>i</a:t>
+            </a:r>
+            <a:r>
+              <a:rPr lang="en-US" sz="1200" b="1" dirty="0" smtClean="0">
+                <a:solidFill>
+                  <a:srgbClr val="640032"/>
+                </a:solidFill>
+              </a:rPr>
+              <a:t>+</a:t>
+            </a:r>
+            <a:r>
+              <a:rPr lang="en-US" sz="1200" b="1" dirty="0" smtClean="0">
+                <a:solidFill>
+                  <a:srgbClr val="000096"/>
+                </a:solidFill>
+              </a:rPr>
+              <a:t>4</a:t>
+            </a:r>
+            <a:r>
+              <a:rPr lang="en-US" sz="1200" b="1" dirty="0" smtClean="0">
+                <a:solidFill>
+                  <a:srgbClr val="960000"/>
+                </a:solidFill>
+              </a:rPr>
+              <a:t>)</a:t>
+            </a:r>
+            <a:r>
+              <a:rPr lang="en-US" sz="1200" b="1" dirty="0" smtClean="0">
+                <a:solidFill>
+                  <a:srgbClr val="000000"/>
+                </a:solidFill>
+              </a:rPr>
+              <a:t> </a:t>
+            </a:r>
+            <a:r>
+              <a:rPr lang="en-US" sz="1200" b="1" dirty="0" smtClean="0">
+                <a:solidFill>
+                  <a:srgbClr val="640032"/>
+                </a:solidFill>
+              </a:rPr>
+              <a:t>%</a:t>
+            </a:r>
+            <a:r>
+              <a:rPr lang="en-US" sz="1200" b="1" dirty="0" smtClean="0">
+                <a:solidFill>
+                  <a:srgbClr val="000000"/>
+                </a:solidFill>
+              </a:rPr>
+              <a:t> </a:t>
+            </a:r>
+            <a:r>
+              <a:rPr lang="en-US" sz="1200" b="1" dirty="0" err="1" smtClean="0">
+                <a:solidFill>
+                  <a:srgbClr val="000000"/>
+                </a:solidFill>
+              </a:rPr>
+              <a:t>np</a:t>
+            </a:r>
+            <a:r>
+              <a:rPr lang="en-US" sz="1200" b="1" dirty="0" smtClean="0">
+                <a:solidFill>
+                  <a:srgbClr val="640032"/>
+                </a:solidFill>
+              </a:rPr>
+              <a:t>,</a:t>
+            </a:r>
+            <a:r>
+              <a:rPr lang="en-US" sz="1200" b="1" dirty="0" smtClean="0">
+                <a:solidFill>
+                  <a:srgbClr val="000000"/>
+                </a:solidFill>
+              </a:rPr>
+              <a:t> </a:t>
+            </a:r>
+            <a:r>
+              <a:rPr lang="en-US" sz="1200" b="1" dirty="0" smtClean="0">
+                <a:solidFill>
+                  <a:srgbClr val="000096"/>
+                </a:solidFill>
+              </a:rPr>
+              <a:t>255</a:t>
+            </a:r>
+            <a:r>
+              <a:rPr lang="en-US" sz="1200" b="1" dirty="0" smtClean="0">
+                <a:solidFill>
+                  <a:srgbClr val="640032"/>
+                </a:solidFill>
+              </a:rPr>
+              <a:t>,</a:t>
+            </a:r>
+            <a:r>
+              <a:rPr lang="en-US" sz="1200" b="1" dirty="0" smtClean="0">
+                <a:solidFill>
+                  <a:srgbClr val="000000"/>
+                </a:solidFill>
+              </a:rPr>
+              <a:t> </a:t>
+            </a:r>
+            <a:r>
+              <a:rPr lang="en-US" sz="1200" b="1" dirty="0" smtClean="0">
+                <a:solidFill>
+                  <a:srgbClr val="000096"/>
+                </a:solidFill>
+              </a:rPr>
+              <a:t>255</a:t>
+            </a:r>
+            <a:r>
+              <a:rPr lang="en-US" sz="1200" b="1" dirty="0" smtClean="0">
+                <a:solidFill>
+                  <a:srgbClr val="640032"/>
+                </a:solidFill>
+              </a:rPr>
+              <a:t>,</a:t>
+            </a:r>
+            <a:r>
+              <a:rPr lang="en-US" sz="1200" b="1" dirty="0" smtClean="0">
+                <a:solidFill>
+                  <a:srgbClr val="000000"/>
+                </a:solidFill>
+              </a:rPr>
+              <a:t> </a:t>
+            </a:r>
+            <a:r>
+              <a:rPr lang="en-US" sz="1200" b="1" dirty="0" smtClean="0">
+                <a:solidFill>
+                  <a:srgbClr val="000096"/>
+                </a:solidFill>
+              </a:rPr>
+              <a:t>0</a:t>
+            </a:r>
+            <a:r>
+              <a:rPr lang="en-US" sz="1200" b="1" dirty="0" smtClean="0">
+                <a:solidFill>
+                  <a:srgbClr val="960000"/>
+                </a:solidFill>
+              </a:rPr>
+              <a:t>)</a:t>
+            </a:r>
+            <a:r>
+              <a:rPr lang="en-US" sz="1200" b="1" dirty="0" smtClean="0">
+                <a:solidFill>
+                  <a:srgbClr val="640032"/>
+                </a:solidFill>
+              </a:rPr>
+              <a:t>;</a:t>
+            </a:r>
+            <a:r>
+              <a:rPr lang="en-US" sz="1200" b="1" dirty="0" smtClean="0">
+                <a:solidFill>
+                  <a:srgbClr val="000000"/>
+                </a:solidFill>
+              </a:rPr>
+              <a:t> </a:t>
+            </a:r>
+            <a:r>
+              <a:rPr lang="en-US" sz="1200" b="1" dirty="0" smtClean="0">
+                <a:solidFill>
+                  <a:srgbClr val="006648"/>
+                </a:solidFill>
+              </a:rPr>
+              <a:t>// yellow</a:t>
+            </a:r>
+            <a:r>
+              <a:rPr lang="en-US" sz="1200" b="1" dirty="0" smtClean="0">
+                <a:solidFill>
+                  <a:srgbClr val="000000"/>
+                </a:solidFill>
+              </a:rPr>
+              <a:t/>
+            </a:r>
+            <a:br>
+              <a:rPr lang="en-US" sz="1200" b="1" dirty="0" smtClean="0">
+                <a:solidFill>
+                  <a:srgbClr val="000000"/>
+                </a:solidFill>
+              </a:rPr>
+            </a:br>
+            <a:r>
+              <a:rPr lang="en-US" sz="1200" b="1" dirty="0" smtClean="0">
+                <a:solidFill>
+                  <a:srgbClr val="000000"/>
+                </a:solidFill>
+              </a:rPr>
+              <a:t>    strip</a:t>
+            </a:r>
+            <a:r>
+              <a:rPr lang="en-US" sz="1200" b="1" dirty="0" smtClean="0">
+                <a:solidFill>
+                  <a:srgbClr val="640032"/>
+                </a:solidFill>
+              </a:rPr>
+              <a:t>.</a:t>
+            </a:r>
+            <a:r>
+              <a:rPr lang="en-US" sz="1200" b="1" dirty="0" smtClean="0">
+                <a:solidFill>
+                  <a:srgbClr val="000000"/>
+                </a:solidFill>
+              </a:rPr>
+              <a:t>setPixelColor</a:t>
+            </a:r>
+            <a:r>
+              <a:rPr lang="en-US" sz="1200" b="1" dirty="0" smtClean="0">
+                <a:solidFill>
+                  <a:srgbClr val="960000"/>
+                </a:solidFill>
+              </a:rPr>
+              <a:t>((</a:t>
+            </a:r>
+            <a:r>
+              <a:rPr lang="en-US" sz="1200" b="1" dirty="0" smtClean="0">
+                <a:solidFill>
+                  <a:srgbClr val="000000"/>
+                </a:solidFill>
+              </a:rPr>
+              <a:t>i</a:t>
+            </a:r>
+            <a:r>
+              <a:rPr lang="en-US" sz="1200" b="1" dirty="0" smtClean="0">
+                <a:solidFill>
+                  <a:srgbClr val="640032"/>
+                </a:solidFill>
+              </a:rPr>
+              <a:t>+</a:t>
+            </a:r>
+            <a:r>
+              <a:rPr lang="en-US" sz="1200" b="1" dirty="0" smtClean="0">
+                <a:solidFill>
+                  <a:srgbClr val="000096"/>
+                </a:solidFill>
+              </a:rPr>
+              <a:t>5</a:t>
+            </a:r>
+            <a:r>
+              <a:rPr lang="en-US" sz="1200" b="1" dirty="0" smtClean="0">
+                <a:solidFill>
+                  <a:srgbClr val="960000"/>
+                </a:solidFill>
+              </a:rPr>
+              <a:t>)</a:t>
+            </a:r>
+            <a:r>
+              <a:rPr lang="en-US" sz="1200" b="1" dirty="0" smtClean="0">
+                <a:solidFill>
+                  <a:srgbClr val="000000"/>
+                </a:solidFill>
+              </a:rPr>
+              <a:t> </a:t>
+            </a:r>
+            <a:r>
+              <a:rPr lang="en-US" sz="1200" b="1" dirty="0" smtClean="0">
+                <a:solidFill>
+                  <a:srgbClr val="640032"/>
+                </a:solidFill>
+              </a:rPr>
+              <a:t>%</a:t>
+            </a:r>
+            <a:r>
+              <a:rPr lang="en-US" sz="1200" b="1" dirty="0" smtClean="0">
+                <a:solidFill>
+                  <a:srgbClr val="000000"/>
+                </a:solidFill>
+              </a:rPr>
+              <a:t> </a:t>
+            </a:r>
+            <a:r>
+              <a:rPr lang="en-US" sz="1200" b="1" dirty="0" err="1" smtClean="0">
+                <a:solidFill>
+                  <a:srgbClr val="000000"/>
+                </a:solidFill>
+              </a:rPr>
+              <a:t>np</a:t>
+            </a:r>
+            <a:r>
+              <a:rPr lang="en-US" sz="1200" b="1" dirty="0" smtClean="0">
+                <a:solidFill>
+                  <a:srgbClr val="640032"/>
+                </a:solidFill>
+              </a:rPr>
+              <a:t>,</a:t>
+            </a:r>
+            <a:r>
+              <a:rPr lang="en-US" sz="1200" b="1" dirty="0" smtClean="0">
+                <a:solidFill>
+                  <a:srgbClr val="000000"/>
+                </a:solidFill>
+              </a:rPr>
+              <a:t> </a:t>
+            </a:r>
+            <a:r>
+              <a:rPr lang="en-US" sz="1200" b="1" dirty="0" smtClean="0">
+                <a:solidFill>
+                  <a:srgbClr val="000096"/>
+                </a:solidFill>
+              </a:rPr>
+              <a:t>110</a:t>
+            </a:r>
+            <a:r>
+              <a:rPr lang="en-US" sz="1200" b="1" dirty="0" smtClean="0">
+                <a:solidFill>
+                  <a:srgbClr val="640032"/>
+                </a:solidFill>
+              </a:rPr>
+              <a:t>,</a:t>
+            </a:r>
+            <a:r>
+              <a:rPr lang="en-US" sz="1200" b="1" dirty="0" smtClean="0">
+                <a:solidFill>
+                  <a:srgbClr val="000000"/>
+                </a:solidFill>
+              </a:rPr>
+              <a:t> </a:t>
+            </a:r>
+            <a:r>
+              <a:rPr lang="en-US" sz="1200" b="1" dirty="0" smtClean="0">
+                <a:solidFill>
+                  <a:srgbClr val="000096"/>
+                </a:solidFill>
+              </a:rPr>
+              <a:t>70</a:t>
+            </a:r>
+            <a:r>
+              <a:rPr lang="en-US" sz="1200" b="1" dirty="0" smtClean="0">
+                <a:solidFill>
+                  <a:srgbClr val="640032"/>
+                </a:solidFill>
+              </a:rPr>
+              <a:t>,</a:t>
+            </a:r>
+            <a:r>
+              <a:rPr lang="en-US" sz="1200" b="1" dirty="0" smtClean="0">
+                <a:solidFill>
+                  <a:srgbClr val="000000"/>
+                </a:solidFill>
+              </a:rPr>
+              <a:t> </a:t>
+            </a:r>
+            <a:r>
+              <a:rPr lang="en-US" sz="1200" b="1" dirty="0" smtClean="0">
+                <a:solidFill>
+                  <a:srgbClr val="000096"/>
+                </a:solidFill>
+              </a:rPr>
+              <a:t>0</a:t>
+            </a:r>
+            <a:r>
+              <a:rPr lang="en-US" sz="1200" b="1" dirty="0" smtClean="0">
+                <a:solidFill>
+                  <a:srgbClr val="960000"/>
+                </a:solidFill>
+              </a:rPr>
+              <a:t>)</a:t>
+            </a:r>
+            <a:r>
+              <a:rPr lang="en-US" sz="1200" b="1" dirty="0" smtClean="0">
+                <a:solidFill>
+                  <a:srgbClr val="640032"/>
+                </a:solidFill>
+              </a:rPr>
+              <a:t>;</a:t>
+            </a:r>
+            <a:r>
+              <a:rPr lang="en-US" sz="1200" b="1" dirty="0" smtClean="0">
+                <a:solidFill>
+                  <a:srgbClr val="000000"/>
+                </a:solidFill>
+              </a:rPr>
+              <a:t> </a:t>
+            </a:r>
+            <a:r>
+              <a:rPr lang="en-US" sz="1200" b="1" dirty="0" smtClean="0">
+                <a:solidFill>
+                  <a:srgbClr val="006648"/>
+                </a:solidFill>
+              </a:rPr>
+              <a:t>// orange</a:t>
+            </a:r>
+            <a:r>
+              <a:rPr lang="en-US" sz="1200" b="1" dirty="0" smtClean="0">
+                <a:solidFill>
+                  <a:srgbClr val="000000"/>
+                </a:solidFill>
+              </a:rPr>
+              <a:t/>
+            </a:r>
+            <a:br>
+              <a:rPr lang="en-US" sz="1200" b="1" dirty="0" smtClean="0">
+                <a:solidFill>
+                  <a:srgbClr val="000000"/>
+                </a:solidFill>
+              </a:rPr>
+            </a:br>
+            <a:r>
+              <a:rPr lang="en-US" sz="1200" b="1" dirty="0" smtClean="0">
+                <a:solidFill>
+                  <a:srgbClr val="000000"/>
+                </a:solidFill>
+              </a:rPr>
+              <a:t>    strip</a:t>
+            </a:r>
+            <a:r>
+              <a:rPr lang="en-US" sz="1200" b="1" dirty="0" smtClean="0">
+                <a:solidFill>
+                  <a:srgbClr val="640032"/>
+                </a:solidFill>
+              </a:rPr>
+              <a:t>.</a:t>
+            </a:r>
+            <a:r>
+              <a:rPr lang="en-US" sz="1200" b="1" dirty="0" smtClean="0">
+                <a:solidFill>
+                  <a:srgbClr val="000000"/>
+                </a:solidFill>
+              </a:rPr>
+              <a:t>setPixelColor</a:t>
+            </a:r>
+            <a:r>
+              <a:rPr lang="en-US" sz="1200" b="1" dirty="0" smtClean="0">
+                <a:solidFill>
+                  <a:srgbClr val="960000"/>
+                </a:solidFill>
+              </a:rPr>
+              <a:t>((</a:t>
+            </a:r>
+            <a:r>
+              <a:rPr lang="en-US" sz="1200" b="1" dirty="0" smtClean="0">
+                <a:solidFill>
+                  <a:srgbClr val="000000"/>
+                </a:solidFill>
+              </a:rPr>
+              <a:t>i</a:t>
+            </a:r>
+            <a:r>
+              <a:rPr lang="en-US" sz="1200" b="1" dirty="0" smtClean="0">
+                <a:solidFill>
+                  <a:srgbClr val="640032"/>
+                </a:solidFill>
+              </a:rPr>
+              <a:t>+</a:t>
+            </a:r>
+            <a:r>
+              <a:rPr lang="en-US" sz="1200" b="1" dirty="0" smtClean="0">
+                <a:solidFill>
+                  <a:srgbClr val="000096"/>
+                </a:solidFill>
+              </a:rPr>
+              <a:t>6</a:t>
+            </a:r>
+            <a:r>
+              <a:rPr lang="en-US" sz="1200" b="1" dirty="0" smtClean="0">
+                <a:solidFill>
+                  <a:srgbClr val="960000"/>
+                </a:solidFill>
+              </a:rPr>
+              <a:t>)</a:t>
+            </a:r>
+            <a:r>
+              <a:rPr lang="en-US" sz="1200" b="1" dirty="0" smtClean="0">
+                <a:solidFill>
+                  <a:srgbClr val="000000"/>
+                </a:solidFill>
+              </a:rPr>
+              <a:t> </a:t>
+            </a:r>
+            <a:r>
+              <a:rPr lang="en-US" sz="1200" b="1" dirty="0" smtClean="0">
+                <a:solidFill>
+                  <a:srgbClr val="640032"/>
+                </a:solidFill>
+              </a:rPr>
+              <a:t>%</a:t>
+            </a:r>
+            <a:r>
+              <a:rPr lang="en-US" sz="1200" b="1" dirty="0" smtClean="0">
+                <a:solidFill>
+                  <a:srgbClr val="000000"/>
+                </a:solidFill>
+              </a:rPr>
+              <a:t> </a:t>
+            </a:r>
+            <a:r>
+              <a:rPr lang="en-US" sz="1200" b="1" dirty="0" err="1" smtClean="0">
+                <a:solidFill>
+                  <a:srgbClr val="000000"/>
+                </a:solidFill>
+              </a:rPr>
+              <a:t>np</a:t>
+            </a:r>
+            <a:r>
+              <a:rPr lang="en-US" sz="1200" b="1" dirty="0" smtClean="0">
+                <a:solidFill>
+                  <a:srgbClr val="640032"/>
+                </a:solidFill>
+              </a:rPr>
+              <a:t>,</a:t>
+            </a:r>
+            <a:r>
+              <a:rPr lang="en-US" sz="1200" b="1" dirty="0" smtClean="0">
+                <a:solidFill>
+                  <a:srgbClr val="000000"/>
+                </a:solidFill>
+              </a:rPr>
+              <a:t> </a:t>
+            </a:r>
+            <a:r>
+              <a:rPr lang="en-US" sz="1200" b="1" dirty="0" smtClean="0">
+                <a:solidFill>
+                  <a:srgbClr val="000096"/>
+                </a:solidFill>
+              </a:rPr>
+              <a:t>150</a:t>
+            </a:r>
+            <a:r>
+              <a:rPr lang="en-US" sz="1200" b="1" dirty="0" smtClean="0">
+                <a:solidFill>
+                  <a:srgbClr val="640032"/>
+                </a:solidFill>
+              </a:rPr>
+              <a:t>,</a:t>
+            </a:r>
+            <a:r>
+              <a:rPr lang="en-US" sz="1200" b="1" dirty="0" smtClean="0">
+                <a:solidFill>
+                  <a:srgbClr val="000000"/>
+                </a:solidFill>
+              </a:rPr>
+              <a:t> </a:t>
+            </a:r>
+            <a:r>
+              <a:rPr lang="en-US" sz="1200" b="1" dirty="0" smtClean="0">
+                <a:solidFill>
+                  <a:srgbClr val="000096"/>
+                </a:solidFill>
+              </a:rPr>
+              <a:t>0</a:t>
+            </a:r>
+            <a:r>
+              <a:rPr lang="en-US" sz="1200" b="1" dirty="0" smtClean="0">
+                <a:solidFill>
+                  <a:srgbClr val="640032"/>
+                </a:solidFill>
+              </a:rPr>
+              <a:t>,</a:t>
+            </a:r>
+            <a:r>
+              <a:rPr lang="en-US" sz="1200" b="1" dirty="0" smtClean="0">
+                <a:solidFill>
+                  <a:srgbClr val="000000"/>
+                </a:solidFill>
+              </a:rPr>
+              <a:t> </a:t>
+            </a:r>
+            <a:r>
+              <a:rPr lang="en-US" sz="1200" b="1" dirty="0" smtClean="0">
+                <a:solidFill>
+                  <a:srgbClr val="000096"/>
+                </a:solidFill>
+              </a:rPr>
+              <a:t>0</a:t>
+            </a:r>
+            <a:r>
+              <a:rPr lang="en-US" sz="1200" b="1" dirty="0" smtClean="0">
+                <a:solidFill>
+                  <a:srgbClr val="960000"/>
+                </a:solidFill>
+              </a:rPr>
+              <a:t>)</a:t>
+            </a:r>
+            <a:r>
+              <a:rPr lang="en-US" sz="1200" b="1" dirty="0" smtClean="0">
+                <a:solidFill>
+                  <a:srgbClr val="640032"/>
+                </a:solidFill>
+              </a:rPr>
+              <a:t>;</a:t>
+            </a:r>
+            <a:r>
+              <a:rPr lang="en-US" sz="1200" b="1" dirty="0" smtClean="0">
+                <a:solidFill>
+                  <a:srgbClr val="000000"/>
+                </a:solidFill>
+              </a:rPr>
+              <a:t> </a:t>
+            </a:r>
+            <a:r>
+              <a:rPr lang="en-US" sz="1200" b="1" dirty="0" smtClean="0">
+                <a:solidFill>
+                  <a:srgbClr val="006648"/>
+                </a:solidFill>
+              </a:rPr>
+              <a:t>// red</a:t>
+            </a:r>
+            <a:r>
+              <a:rPr lang="en-US" sz="1200" b="1" dirty="0" smtClean="0">
+                <a:solidFill>
+                  <a:srgbClr val="000000"/>
+                </a:solidFill>
+              </a:rPr>
+              <a:t/>
+            </a:r>
+            <a:br>
+              <a:rPr lang="en-US" sz="1200" b="1" dirty="0" smtClean="0">
+                <a:solidFill>
+                  <a:srgbClr val="000000"/>
+                </a:solidFill>
+              </a:rPr>
+            </a:br>
+            <a:r>
+              <a:rPr lang="en-US" sz="1200" b="1" dirty="0" smtClean="0">
+                <a:solidFill>
+                  <a:srgbClr val="000000"/>
+                </a:solidFill>
+              </a:rPr>
+              <a:t>    </a:t>
+            </a:r>
+            <a:r>
+              <a:rPr lang="en-US" sz="1200" b="1" dirty="0" smtClean="0">
+                <a:solidFill>
+                  <a:srgbClr val="006648"/>
+                </a:solidFill>
+              </a:rPr>
+              <a:t>// we don't need to touch 7, 8 and 9</a:t>
+            </a:r>
+            <a:r>
+              <a:rPr lang="en-US" sz="1200" b="1" dirty="0" smtClean="0">
+                <a:solidFill>
+                  <a:srgbClr val="000000"/>
+                </a:solidFill>
+              </a:rPr>
+              <a:t/>
+            </a:r>
+            <a:br>
+              <a:rPr lang="en-US" sz="1200" b="1" dirty="0" smtClean="0">
+                <a:solidFill>
+                  <a:srgbClr val="000000"/>
+                </a:solidFill>
+              </a:rPr>
+            </a:br>
+            <a:r>
+              <a:rPr lang="en-US" sz="1200" b="1" dirty="0" smtClean="0">
+                <a:solidFill>
+                  <a:srgbClr val="000000"/>
+                </a:solidFill>
+              </a:rPr>
+              <a:t>    strip</a:t>
+            </a:r>
+            <a:r>
+              <a:rPr lang="en-US" sz="1200" b="1" dirty="0" smtClean="0">
+                <a:solidFill>
+                  <a:srgbClr val="640032"/>
+                </a:solidFill>
+              </a:rPr>
+              <a:t>.</a:t>
+            </a:r>
+            <a:r>
+              <a:rPr lang="en-US" sz="1200" b="1" dirty="0" smtClean="0">
+                <a:solidFill>
+                  <a:srgbClr val="000000"/>
+                </a:solidFill>
+              </a:rPr>
+              <a:t>setPixelColor</a:t>
+            </a:r>
+            <a:r>
+              <a:rPr lang="en-US" sz="1200" b="1" dirty="0" smtClean="0">
+                <a:solidFill>
+                  <a:srgbClr val="960000"/>
+                </a:solidFill>
+              </a:rPr>
+              <a:t>((</a:t>
+            </a:r>
+            <a:r>
+              <a:rPr lang="en-US" sz="1200" b="1" dirty="0" smtClean="0">
+                <a:solidFill>
+                  <a:srgbClr val="000000"/>
+                </a:solidFill>
+              </a:rPr>
+              <a:t>i</a:t>
+            </a:r>
+            <a:r>
+              <a:rPr lang="en-US" sz="1200" b="1" dirty="0" smtClean="0">
+                <a:solidFill>
+                  <a:srgbClr val="640032"/>
+                </a:solidFill>
+              </a:rPr>
+              <a:t>+</a:t>
+            </a:r>
+            <a:r>
+              <a:rPr lang="en-US" sz="1200" b="1" dirty="0" smtClean="0">
+                <a:solidFill>
+                  <a:srgbClr val="000096"/>
+                </a:solidFill>
+              </a:rPr>
+              <a:t>10</a:t>
+            </a:r>
+            <a:r>
+              <a:rPr lang="en-US" sz="1200" b="1" dirty="0" smtClean="0">
+                <a:solidFill>
+                  <a:srgbClr val="960000"/>
+                </a:solidFill>
+              </a:rPr>
+              <a:t>)</a:t>
+            </a:r>
+            <a:r>
+              <a:rPr lang="en-US" sz="1200" b="1" dirty="0" smtClean="0">
+                <a:solidFill>
+                  <a:srgbClr val="000000"/>
+                </a:solidFill>
+              </a:rPr>
+              <a:t> </a:t>
+            </a:r>
+            <a:r>
+              <a:rPr lang="en-US" sz="1200" b="1" dirty="0" smtClean="0">
+                <a:solidFill>
+                  <a:srgbClr val="640032"/>
+                </a:solidFill>
+              </a:rPr>
+              <a:t>%</a:t>
+            </a:r>
+            <a:r>
+              <a:rPr lang="en-US" sz="1200" b="1" dirty="0" smtClean="0">
+                <a:solidFill>
+                  <a:srgbClr val="000000"/>
+                </a:solidFill>
+              </a:rPr>
+              <a:t> </a:t>
+            </a:r>
+            <a:r>
+              <a:rPr lang="en-US" sz="1200" b="1" dirty="0" err="1" smtClean="0">
+                <a:solidFill>
+                  <a:srgbClr val="000000"/>
+                </a:solidFill>
+              </a:rPr>
+              <a:t>np</a:t>
+            </a:r>
+            <a:r>
+              <a:rPr lang="en-US" sz="1200" b="1" dirty="0" smtClean="0">
+                <a:solidFill>
+                  <a:srgbClr val="640032"/>
+                </a:solidFill>
+              </a:rPr>
+              <a:t>,</a:t>
+            </a:r>
+            <a:r>
+              <a:rPr lang="en-US" sz="1200" b="1" dirty="0" smtClean="0">
+                <a:solidFill>
+                  <a:srgbClr val="000000"/>
+                </a:solidFill>
+              </a:rPr>
+              <a:t> </a:t>
+            </a:r>
+            <a:r>
+              <a:rPr lang="en-US" sz="1200" b="1" dirty="0" smtClean="0">
+                <a:solidFill>
+                  <a:srgbClr val="000096"/>
+                </a:solidFill>
+              </a:rPr>
+              <a:t>0</a:t>
+            </a:r>
+            <a:r>
+              <a:rPr lang="en-US" sz="1200" b="1" dirty="0" smtClean="0">
+                <a:solidFill>
+                  <a:srgbClr val="640032"/>
+                </a:solidFill>
+              </a:rPr>
+              <a:t>,</a:t>
+            </a:r>
+            <a:r>
+              <a:rPr lang="en-US" sz="1200" b="1" dirty="0" smtClean="0">
+                <a:solidFill>
+                  <a:srgbClr val="000000"/>
+                </a:solidFill>
+              </a:rPr>
+              <a:t> </a:t>
+            </a:r>
+            <a:r>
+              <a:rPr lang="en-US" sz="1200" b="1" dirty="0" smtClean="0">
+                <a:solidFill>
+                  <a:srgbClr val="000096"/>
+                </a:solidFill>
+              </a:rPr>
+              <a:t>0</a:t>
+            </a:r>
+            <a:r>
+              <a:rPr lang="en-US" sz="1200" b="1" dirty="0" smtClean="0">
+                <a:solidFill>
+                  <a:srgbClr val="640032"/>
+                </a:solidFill>
+              </a:rPr>
+              <a:t>,</a:t>
+            </a:r>
+            <a:r>
+              <a:rPr lang="en-US" sz="1200" b="1" dirty="0" smtClean="0">
+                <a:solidFill>
+                  <a:srgbClr val="000000"/>
+                </a:solidFill>
+              </a:rPr>
+              <a:t> </a:t>
+            </a:r>
+            <a:r>
+              <a:rPr lang="en-US" sz="1200" b="1" dirty="0" smtClean="0">
+                <a:solidFill>
+                  <a:srgbClr val="000096"/>
+                </a:solidFill>
+              </a:rPr>
+              <a:t>0</a:t>
+            </a:r>
+            <a:r>
+              <a:rPr lang="en-US" sz="1200" b="1" dirty="0" smtClean="0">
+                <a:solidFill>
+                  <a:srgbClr val="960000"/>
+                </a:solidFill>
+              </a:rPr>
+              <a:t>)</a:t>
+            </a:r>
+            <a:r>
+              <a:rPr lang="en-US" sz="1200" b="1" dirty="0" smtClean="0">
+                <a:solidFill>
+                  <a:srgbClr val="640032"/>
+                </a:solidFill>
+              </a:rPr>
+              <a:t>;</a:t>
+            </a:r>
+            <a:r>
+              <a:rPr lang="en-US" sz="1200" b="1" dirty="0" smtClean="0">
+                <a:solidFill>
+                  <a:srgbClr val="000000"/>
+                </a:solidFill>
+              </a:rPr>
+              <a:t> </a:t>
+            </a:r>
+            <a:r>
+              <a:rPr lang="en-US" sz="1200" b="1" dirty="0" smtClean="0">
+                <a:solidFill>
+                  <a:srgbClr val="006648"/>
+                </a:solidFill>
+              </a:rPr>
+              <a:t>// turn the second to the last one off</a:t>
+            </a:r>
+            <a:r>
+              <a:rPr lang="en-US" sz="1200" b="1" dirty="0" smtClean="0">
+                <a:solidFill>
+                  <a:srgbClr val="000000"/>
+                </a:solidFill>
+              </a:rPr>
+              <a:t/>
+            </a:r>
+            <a:br>
+              <a:rPr lang="en-US" sz="1200" b="1" dirty="0" smtClean="0">
+                <a:solidFill>
+                  <a:srgbClr val="000000"/>
+                </a:solidFill>
+              </a:rPr>
+            </a:br>
+            <a:r>
+              <a:rPr lang="en-US" sz="1200" b="1" dirty="0" smtClean="0">
+                <a:solidFill>
+                  <a:srgbClr val="000000"/>
+                </a:solidFill>
+              </a:rPr>
+              <a:t>    strip</a:t>
+            </a:r>
+            <a:r>
+              <a:rPr lang="en-US" sz="1200" b="1" dirty="0" smtClean="0">
+                <a:solidFill>
+                  <a:srgbClr val="640032"/>
+                </a:solidFill>
+              </a:rPr>
+              <a:t>.</a:t>
+            </a:r>
+            <a:r>
+              <a:rPr lang="en-US" sz="1200" b="1" dirty="0" smtClean="0">
+                <a:solidFill>
+                  <a:srgbClr val="000000"/>
+                </a:solidFill>
+              </a:rPr>
+              <a:t>setPixelColor</a:t>
+            </a:r>
+            <a:r>
+              <a:rPr lang="en-US" sz="1200" b="1" dirty="0" smtClean="0">
+                <a:solidFill>
+                  <a:srgbClr val="960000"/>
+                </a:solidFill>
+              </a:rPr>
+              <a:t>((</a:t>
+            </a:r>
+            <a:r>
+              <a:rPr lang="en-US" sz="1200" b="1" dirty="0" smtClean="0">
+                <a:solidFill>
+                  <a:srgbClr val="000000"/>
+                </a:solidFill>
+              </a:rPr>
+              <a:t>i</a:t>
+            </a:r>
+            <a:r>
+              <a:rPr lang="en-US" sz="1200" b="1" dirty="0" smtClean="0">
+                <a:solidFill>
+                  <a:srgbClr val="640032"/>
+                </a:solidFill>
+              </a:rPr>
+              <a:t>+</a:t>
+            </a:r>
+            <a:r>
+              <a:rPr lang="en-US" sz="1200" b="1" dirty="0" smtClean="0">
+                <a:solidFill>
+                  <a:srgbClr val="000096"/>
+                </a:solidFill>
+              </a:rPr>
+              <a:t>11</a:t>
+            </a:r>
+            <a:r>
+              <a:rPr lang="en-US" sz="1200" b="1" dirty="0" smtClean="0">
+                <a:solidFill>
+                  <a:srgbClr val="960000"/>
+                </a:solidFill>
+              </a:rPr>
+              <a:t>)</a:t>
+            </a:r>
+            <a:r>
+              <a:rPr lang="en-US" sz="1200" b="1" dirty="0" smtClean="0">
+                <a:solidFill>
+                  <a:srgbClr val="000000"/>
+                </a:solidFill>
+              </a:rPr>
+              <a:t> </a:t>
+            </a:r>
+            <a:r>
+              <a:rPr lang="en-US" sz="1200" b="1" dirty="0" smtClean="0">
+                <a:solidFill>
+                  <a:srgbClr val="640032"/>
+                </a:solidFill>
+              </a:rPr>
+              <a:t>%</a:t>
+            </a:r>
+            <a:r>
+              <a:rPr lang="en-US" sz="1200" b="1" dirty="0" smtClean="0">
+                <a:solidFill>
+                  <a:srgbClr val="000000"/>
+                </a:solidFill>
+              </a:rPr>
+              <a:t> </a:t>
+            </a:r>
+            <a:r>
+              <a:rPr lang="en-US" sz="1200" b="1" dirty="0" err="1" smtClean="0">
+                <a:solidFill>
+                  <a:srgbClr val="000000"/>
+                </a:solidFill>
+              </a:rPr>
+              <a:t>np</a:t>
+            </a:r>
+            <a:r>
+              <a:rPr lang="en-US" sz="1200" b="1" dirty="0" smtClean="0">
+                <a:solidFill>
+                  <a:srgbClr val="640032"/>
+                </a:solidFill>
+              </a:rPr>
+              <a:t>,</a:t>
+            </a:r>
+            <a:r>
+              <a:rPr lang="en-US" sz="1200" b="1" dirty="0" smtClean="0">
+                <a:solidFill>
+                  <a:srgbClr val="000000"/>
+                </a:solidFill>
+              </a:rPr>
+              <a:t> </a:t>
+            </a:r>
+            <a:r>
+              <a:rPr lang="en-US" sz="1200" b="1" dirty="0" smtClean="0">
+                <a:solidFill>
+                  <a:srgbClr val="000096"/>
+                </a:solidFill>
+              </a:rPr>
+              <a:t>0</a:t>
+            </a:r>
+            <a:r>
+              <a:rPr lang="en-US" sz="1200" b="1" dirty="0" smtClean="0">
+                <a:solidFill>
+                  <a:srgbClr val="640032"/>
+                </a:solidFill>
+              </a:rPr>
+              <a:t>,</a:t>
+            </a:r>
+            <a:r>
+              <a:rPr lang="en-US" sz="1200" b="1" dirty="0" smtClean="0">
+                <a:solidFill>
+                  <a:srgbClr val="000000"/>
+                </a:solidFill>
+              </a:rPr>
+              <a:t> </a:t>
+            </a:r>
+            <a:r>
+              <a:rPr lang="en-US" sz="1200" b="1" dirty="0" smtClean="0">
+                <a:solidFill>
+                  <a:srgbClr val="000096"/>
+                </a:solidFill>
+              </a:rPr>
+              <a:t>0</a:t>
+            </a:r>
+            <a:r>
+              <a:rPr lang="en-US" sz="1200" b="1" dirty="0" smtClean="0">
+                <a:solidFill>
+                  <a:srgbClr val="640032"/>
+                </a:solidFill>
+              </a:rPr>
+              <a:t>,</a:t>
+            </a:r>
+            <a:r>
+              <a:rPr lang="en-US" sz="1200" b="1" dirty="0" smtClean="0">
+                <a:solidFill>
+                  <a:srgbClr val="000000"/>
+                </a:solidFill>
+              </a:rPr>
+              <a:t> </a:t>
+            </a:r>
+            <a:r>
+              <a:rPr lang="en-US" sz="1200" b="1" dirty="0" smtClean="0">
+                <a:solidFill>
+                  <a:srgbClr val="000096"/>
+                </a:solidFill>
+              </a:rPr>
+              <a:t>0</a:t>
+            </a:r>
+            <a:r>
+              <a:rPr lang="en-US" sz="1200" b="1" dirty="0" smtClean="0">
+                <a:solidFill>
+                  <a:srgbClr val="960000"/>
+                </a:solidFill>
+              </a:rPr>
+              <a:t>)</a:t>
+            </a:r>
+            <a:r>
+              <a:rPr lang="en-US" sz="1200" b="1" dirty="0" smtClean="0">
+                <a:solidFill>
+                  <a:srgbClr val="640032"/>
+                </a:solidFill>
+              </a:rPr>
+              <a:t>;</a:t>
+            </a:r>
+            <a:r>
+              <a:rPr lang="en-US" sz="1200" b="1" dirty="0" smtClean="0">
+                <a:solidFill>
+                  <a:srgbClr val="000000"/>
+                </a:solidFill>
+              </a:rPr>
+              <a:t> </a:t>
+            </a:r>
+            <a:r>
+              <a:rPr lang="en-US" sz="1200" b="1" dirty="0" smtClean="0">
+                <a:solidFill>
+                  <a:srgbClr val="006648"/>
+                </a:solidFill>
+              </a:rPr>
+              <a:t>// turn the last one off</a:t>
+            </a:r>
+            <a:r>
+              <a:rPr lang="en-US" sz="1200" b="1" dirty="0" smtClean="0">
+                <a:solidFill>
+                  <a:srgbClr val="000000"/>
+                </a:solidFill>
+              </a:rPr>
+              <a:t/>
+            </a:r>
+            <a:br>
+              <a:rPr lang="en-US" sz="1200" b="1" dirty="0" smtClean="0">
+                <a:solidFill>
+                  <a:srgbClr val="000000"/>
+                </a:solidFill>
+              </a:rPr>
+            </a:br>
+            <a:r>
+              <a:rPr lang="en-US" sz="1200" b="1" dirty="0" smtClean="0">
+                <a:solidFill>
+                  <a:srgbClr val="000000"/>
+                </a:solidFill>
+              </a:rPr>
+              <a:t>    strip</a:t>
+            </a:r>
+            <a:r>
+              <a:rPr lang="en-US" sz="1200" b="1" dirty="0" smtClean="0">
+                <a:solidFill>
+                  <a:srgbClr val="640032"/>
+                </a:solidFill>
+              </a:rPr>
+              <a:t>.</a:t>
+            </a:r>
+            <a:r>
+              <a:rPr lang="en-US" sz="1200" b="1" dirty="0" smtClean="0">
+                <a:solidFill>
+                  <a:srgbClr val="000000"/>
+                </a:solidFill>
+              </a:rPr>
+              <a:t>show</a:t>
+            </a:r>
+            <a:r>
+              <a:rPr lang="en-US" sz="1200" b="1" dirty="0" smtClean="0">
+                <a:solidFill>
+                  <a:srgbClr val="960000"/>
+                </a:solidFill>
+              </a:rPr>
+              <a:t>()</a:t>
+            </a:r>
+            <a:r>
+              <a:rPr lang="en-US" sz="1200" b="1" dirty="0" smtClean="0">
+                <a:solidFill>
+                  <a:srgbClr val="640032"/>
+                </a:solidFill>
+              </a:rPr>
+              <a:t>;</a:t>
+            </a:r>
+            <a:r>
+              <a:rPr lang="en-US" sz="1200" b="1" dirty="0" smtClean="0">
+                <a:solidFill>
+                  <a:srgbClr val="000000"/>
+                </a:solidFill>
+              </a:rPr>
+              <a:t/>
+            </a:r>
+            <a:br>
+              <a:rPr lang="en-US" sz="1200" b="1" dirty="0" smtClean="0">
+                <a:solidFill>
+                  <a:srgbClr val="000000"/>
+                </a:solidFill>
+              </a:rPr>
+            </a:br>
+            <a:r>
+              <a:rPr lang="en-US" sz="1200" b="1" dirty="0" smtClean="0">
+                <a:solidFill>
+                  <a:srgbClr val="000000"/>
+                </a:solidFill>
+              </a:rPr>
+              <a:t>    delay</a:t>
+            </a:r>
+            <a:r>
+              <a:rPr lang="en-US" sz="1200" b="1" dirty="0" smtClean="0">
+                <a:solidFill>
+                  <a:srgbClr val="960000"/>
+                </a:solidFill>
+              </a:rPr>
+              <a:t>(</a:t>
+            </a:r>
+            <a:r>
+              <a:rPr lang="en-US" sz="1200" b="1" dirty="0" smtClean="0">
+                <a:solidFill>
+                  <a:srgbClr val="000000"/>
+                </a:solidFill>
+              </a:rPr>
+              <a:t>wait</a:t>
+            </a:r>
+            <a:r>
+              <a:rPr lang="en-US" sz="1200" b="1" dirty="0" smtClean="0">
+                <a:solidFill>
+                  <a:srgbClr val="960000"/>
+                </a:solidFill>
+              </a:rPr>
+              <a:t>)</a:t>
+            </a:r>
+            <a:r>
+              <a:rPr lang="en-US" sz="1200" b="1" dirty="0" smtClean="0">
+                <a:solidFill>
+                  <a:srgbClr val="640032"/>
+                </a:solidFill>
+              </a:rPr>
+              <a:t>;</a:t>
+            </a:r>
+            <a:endParaRPr lang="en-US" sz="1200" b="1" dirty="0" smtClean="0">
+              <a:solidFill>
+                <a:srgbClr val="000000"/>
+              </a:solidFill>
+            </a:endParaRPr>
+          </a:p>
+          <a:p>
+            <a:pPr>
+              <a:buNone/>
+            </a:pPr>
+            <a:r>
+              <a:rPr lang="en-US" sz="1200" b="1" dirty="0" smtClean="0">
+                <a:solidFill>
+                  <a:srgbClr val="960000"/>
+                </a:solidFill>
+              </a:rPr>
+              <a:t>}</a:t>
+            </a:r>
+            <a:endParaRPr lang="en-US" sz="1200" dirty="0"/>
+          </a:p>
+        </p:txBody>
+      </p:sp>
+    </p:spTree>
+  </p:cSld>
+  <p:clrMapOvr>
+    <a:masterClrMapping/>
+  </p:clrMapOvr>
+</p:sld>
+</file>
+
+<file path=ppt/slides/slide3.xml><?xml version="1.0" encoding="utf-8"?>
+<p:sld xmlns:a="http://schemas.openxmlformats.org/drawingml/2006/main" xmlns:r="http://schemas.openxmlformats.org/officeDocument/2006/relationships" xmlns:p="http://schemas.openxmlformats.org/presentationml/2006/main">
+  <p:cSld>
+    <p:spTree>
+      <p:nvGrpSpPr>
+        <p:cNvPr id="1" name=""/>
+        <p:cNvGrpSpPr/>
+        <p:nvPr/>
+      </p:nvGrpSpPr>
+      <p:grpSpPr>
+        <a:xfrm>
+          <a:off x="0" y="0"/>
+          <a:ext cx="0" cy="0"/>
+          <a:chOff x="0" y="0"/>
+          <a:chExt cx="0" cy="0"/>
+        </a:xfrm>
+      </p:grpSpPr>
+      <p:sp>
+        <p:nvSpPr>
+          <p:cNvPr id="1026" name="AutoShape 2" descr="Inline image 1"/>
+          <p:cNvSpPr>
+            <a:spLocks noChangeAspect="1" noChangeArrowheads="1"/>
+          </p:cNvSpPr>
+          <p:nvPr/>
+        </p:nvSpPr>
+        <p:spPr bwMode="auto">
+          <a:xfrm>
+            <a:off x="155575" y="-144463"/>
+            <a:ext cx="304800" cy="304801"/>
+          </a:xfrm>
+          <a:prstGeom prst="rect">
+            <a:avLst/>
+          </a:prstGeom>
+          <a:noFill/>
+        </p:spPr>
+        <p:txBody>
+          <a:bodyPr vert="horz" wrap="square" lIns="91440" tIns="45720" rIns="91440" bIns="45720" numCol="1" anchor="t" anchorCtr="0" compatLnSpc="1">
+            <a:prstTxWarp prst="textNoShape">
+              <a:avLst/>
+            </a:prstTxWarp>
+          </a:bodyPr>
+          <a:lstStyle/>
+          <a:p>
+            <a:endParaRPr lang="en-US"/>
+          </a:p>
+        </p:txBody>
+      </p:sp>
+      <p:pic>
+        <p:nvPicPr>
+          <p:cNvPr id="1027" name="Picture 3" descr="D:\Downloads\Achievement.jpg"/>
+          <p:cNvPicPr>
+            <a:picLocks noChangeAspect="1" noChangeArrowheads="1"/>
+          </p:cNvPicPr>
+          <p:nvPr/>
+        </p:nvPicPr>
+        <p:blipFill>
+          <a:blip r:embed="rId2" cstate="print"/>
+          <a:srcRect/>
+          <a:stretch>
+            <a:fillRect/>
+          </a:stretch>
+        </p:blipFill>
+        <p:spPr bwMode="auto">
+          <a:xfrm>
+            <a:off x="304800" y="304800"/>
+            <a:ext cx="8305800" cy="6421126"/>
+          </a:xfrm>
+          <a:prstGeom prst="rect">
+            <a:avLst/>
+          </a:prstGeom>
+          <a:noFill/>
+        </p:spPr>
+      </p:pic>
+      <p:sp>
+        <p:nvSpPr>
+          <p:cNvPr id="6" name="TextBox 5"/>
+          <p:cNvSpPr txBox="1"/>
+          <p:nvPr/>
+        </p:nvSpPr>
+        <p:spPr>
+          <a:xfrm>
+            <a:off x="2209800" y="4572000"/>
+            <a:ext cx="762000" cy="369332"/>
+          </a:xfrm>
+          <a:prstGeom prst="rect">
+            <a:avLst/>
+          </a:prstGeom>
+          <a:noFill/>
+        </p:spPr>
+        <p:txBody>
+          <a:bodyPr wrap="square" rtlCol="0">
+            <a:spAutoFit/>
+          </a:bodyPr>
+          <a:lstStyle/>
+          <a:p>
+            <a:pPr algn="ctr"/>
+            <a:r>
+              <a:rPr lang="en-US" i="1" dirty="0" smtClean="0">
+                <a:latin typeface="Times New Roman" pitchFamily="18" charset="0"/>
+                <a:cs typeface="Times New Roman" pitchFamily="18" charset="0"/>
+              </a:rPr>
+              <a:t>17th</a:t>
+            </a:r>
+            <a:endParaRPr lang="en-US" i="1" dirty="0">
+              <a:latin typeface="Times New Roman" pitchFamily="18" charset="0"/>
+              <a:cs typeface="Times New Roman" pitchFamily="18" charset="0"/>
+            </a:endParaRPr>
+          </a:p>
+        </p:txBody>
+      </p:sp>
+      <p:sp>
+        <p:nvSpPr>
+          <p:cNvPr id="7" name="TextBox 6"/>
+          <p:cNvSpPr txBox="1"/>
+          <p:nvPr/>
+        </p:nvSpPr>
+        <p:spPr>
+          <a:xfrm>
+            <a:off x="3657600" y="4572000"/>
+            <a:ext cx="990600" cy="369332"/>
+          </a:xfrm>
+          <a:prstGeom prst="rect">
+            <a:avLst/>
+          </a:prstGeom>
+          <a:noFill/>
+        </p:spPr>
+        <p:txBody>
+          <a:bodyPr wrap="square" rtlCol="0">
+            <a:spAutoFit/>
+          </a:bodyPr>
+          <a:lstStyle/>
+          <a:p>
+            <a:pPr algn="ctr"/>
+            <a:r>
+              <a:rPr lang="en-US" i="1" dirty="0" smtClean="0">
+                <a:latin typeface="Times New Roman" pitchFamily="18" charset="0"/>
+                <a:cs typeface="Times New Roman" pitchFamily="18" charset="0"/>
+              </a:rPr>
+              <a:t>October</a:t>
+            </a:r>
+            <a:endParaRPr lang="en-US" i="1" dirty="0">
+              <a:latin typeface="Times New Roman" pitchFamily="18" charset="0"/>
+              <a:cs typeface="Times New Roman" pitchFamily="18" charset="0"/>
+            </a:endParaRPr>
+          </a:p>
+        </p:txBody>
+      </p:sp>
+      <p:sp>
+        <p:nvSpPr>
+          <p:cNvPr id="8" name="TextBox 7"/>
+          <p:cNvSpPr txBox="1"/>
+          <p:nvPr/>
+        </p:nvSpPr>
+        <p:spPr>
+          <a:xfrm>
+            <a:off x="5486400" y="4572000"/>
+            <a:ext cx="838200" cy="369332"/>
+          </a:xfrm>
+          <a:prstGeom prst="rect">
+            <a:avLst/>
+          </a:prstGeom>
+          <a:noFill/>
+        </p:spPr>
+        <p:txBody>
+          <a:bodyPr wrap="square" rtlCol="0">
+            <a:spAutoFit/>
+          </a:bodyPr>
+          <a:lstStyle/>
+          <a:p>
+            <a:pPr algn="ctr"/>
+            <a:r>
+              <a:rPr lang="en-US" i="1" dirty="0" smtClean="0">
+                <a:latin typeface="Times New Roman" pitchFamily="18" charset="0"/>
+                <a:cs typeface="Times New Roman" pitchFamily="18" charset="0"/>
+              </a:rPr>
+              <a:t>2015</a:t>
+            </a:r>
+            <a:endParaRPr lang="en-US" i="1" dirty="0">
+              <a:latin typeface="Times New Roman" pitchFamily="18" charset="0"/>
+              <a:cs typeface="Times New Roman" pitchFamily="18" charset="0"/>
+            </a:endParaRPr>
+          </a:p>
+        </p:txBody>
+      </p:sp>
+      <p:sp>
+        <p:nvSpPr>
+          <p:cNvPr id="9" name="TextBox 8"/>
+          <p:cNvSpPr txBox="1"/>
+          <p:nvPr/>
+        </p:nvSpPr>
+        <p:spPr>
+          <a:xfrm>
+            <a:off x="990600" y="990600"/>
+            <a:ext cx="1066800" cy="923330"/>
+          </a:xfrm>
+          <a:prstGeom prst="rect">
+            <a:avLst/>
+          </a:prstGeom>
+          <a:noFill/>
+        </p:spPr>
+        <p:txBody>
+          <a:bodyPr wrap="square" rtlCol="0">
+            <a:spAutoFit/>
+          </a:bodyPr>
+          <a:lstStyle/>
+          <a:p>
+            <a:pPr algn="ctr"/>
+            <a:r>
+              <a:rPr lang="en-US" i="1" dirty="0" smtClean="0">
+                <a:latin typeface="Times New Roman" pitchFamily="18" charset="0"/>
+                <a:cs typeface="Times New Roman" pitchFamily="18" charset="0"/>
+              </a:rPr>
+              <a:t>Internet of Things</a:t>
+            </a:r>
+          </a:p>
+          <a:p>
+            <a:pPr algn="ctr"/>
+            <a:r>
+              <a:rPr lang="en-US" i="1" dirty="0" smtClean="0">
+                <a:latin typeface="Times New Roman" pitchFamily="18" charset="0"/>
+                <a:cs typeface="Times New Roman" pitchFamily="18" charset="0"/>
+              </a:rPr>
+              <a:t>HackDay</a:t>
+            </a:r>
+            <a:endParaRPr lang="en-US" i="1" dirty="0">
+              <a:latin typeface="Times New Roman" pitchFamily="18" charset="0"/>
+              <a:cs typeface="Times New Roman" pitchFamily="18" charset="0"/>
+            </a:endParaRPr>
+          </a:p>
+        </p:txBody>
+      </p:sp>
+      <p:sp>
+        <p:nvSpPr>
+          <p:cNvPr id="10" name="TextBox 9"/>
+          <p:cNvSpPr txBox="1"/>
+          <p:nvPr/>
+        </p:nvSpPr>
+        <p:spPr>
+          <a:xfrm>
+            <a:off x="2362200" y="3962400"/>
+            <a:ext cx="4114800" cy="369332"/>
+          </a:xfrm>
+          <a:prstGeom prst="rect">
+            <a:avLst/>
+          </a:prstGeom>
+          <a:noFill/>
+        </p:spPr>
+        <p:txBody>
+          <a:bodyPr wrap="square" rtlCol="0">
+            <a:spAutoFit/>
+          </a:bodyPr>
+          <a:lstStyle/>
+          <a:p>
+            <a:pPr algn="ctr"/>
+            <a:r>
+              <a:rPr lang="en-US" i="1" dirty="0" smtClean="0">
+                <a:latin typeface="Times New Roman" pitchFamily="18" charset="0"/>
+                <a:cs typeface="Times New Roman" pitchFamily="18" charset="0"/>
+              </a:rPr>
+              <a:t>Arduino LED Halloween Costume Design</a:t>
+            </a:r>
+            <a:endParaRPr lang="en-US" i="1" dirty="0">
+              <a:latin typeface="Times New Roman" pitchFamily="18" charset="0"/>
+              <a:cs typeface="Times New Roman" pitchFamily="18" charset="0"/>
+            </a:endParaRPr>
+          </a:p>
+        </p:txBody>
+      </p:sp>
+      <p:sp>
+        <p:nvSpPr>
+          <p:cNvPr id="11" name="TextBox 10"/>
+          <p:cNvSpPr txBox="1"/>
+          <p:nvPr/>
+        </p:nvSpPr>
+        <p:spPr>
+          <a:xfrm>
+            <a:off x="3124200" y="5105400"/>
+            <a:ext cx="3124200" cy="461665"/>
+          </a:xfrm>
+          <a:prstGeom prst="rect">
+            <a:avLst/>
+          </a:prstGeom>
+          <a:noFill/>
+        </p:spPr>
+        <p:txBody>
+          <a:bodyPr wrap="square" rtlCol="0">
+            <a:spAutoFit/>
+          </a:bodyPr>
+          <a:lstStyle/>
+          <a:p>
+            <a:pPr algn="ctr"/>
+            <a:r>
+              <a:rPr lang="en-US" sz="2400" b="1" i="1" dirty="0" smtClean="0">
+                <a:latin typeface="French Script MT" pitchFamily="66" charset="0"/>
+                <a:cs typeface="Times New Roman" pitchFamily="18" charset="0"/>
+              </a:rPr>
+              <a:t>Ann Kelly and Dan McCreary</a:t>
+            </a:r>
+            <a:endParaRPr lang="en-US" sz="2400" b="1" i="1" dirty="0">
+              <a:latin typeface="French Script MT" pitchFamily="66" charset="0"/>
+              <a:cs typeface="Times New Roman" pitchFamily="18" charset="0"/>
+            </a:endParaRPr>
+          </a:p>
+        </p:txBody>
+      </p:sp>
+      <p:pic>
+        <p:nvPicPr>
+          <p:cNvPr id="1029" name="Picture 5" descr="http://www.fooa.org/wp-content/uploads/2015/08/halloween-pumpkin-clip-art-free.jpg"/>
+          <p:cNvPicPr>
+            <a:picLocks noChangeAspect="1" noChangeArrowheads="1"/>
+          </p:cNvPicPr>
+          <p:nvPr/>
+        </p:nvPicPr>
+        <p:blipFill>
+          <a:blip r:embed="rId3" cstate="print"/>
+          <a:srcRect/>
+          <a:stretch>
+            <a:fillRect/>
+          </a:stretch>
+        </p:blipFill>
+        <p:spPr bwMode="auto">
+          <a:xfrm>
+            <a:off x="7010400" y="990600"/>
+            <a:ext cx="756476" cy="838200"/>
+          </a:xfrm>
+          <a:prstGeom prst="rect">
+            <a:avLst/>
+          </a:prstGeom>
+          <a:noFill/>
+        </p:spPr>
+      </p:pic>
+      <p:pic>
+        <p:nvPicPr>
+          <p:cNvPr id="1031" name="Picture 7" descr="IoTHackDay"/>
+          <p:cNvPicPr>
+            <a:picLocks noChangeAspect="1" noChangeArrowheads="1"/>
+          </p:cNvPicPr>
+          <p:nvPr/>
+        </p:nvPicPr>
+        <p:blipFill>
+          <a:blip r:embed="rId4" cstate="print"/>
+          <a:srcRect r="86742"/>
+          <a:stretch>
+            <a:fillRect/>
+          </a:stretch>
+        </p:blipFill>
+        <p:spPr bwMode="auto">
+          <a:xfrm>
+            <a:off x="1066800" y="2894731"/>
+            <a:ext cx="1371600" cy="1379419"/>
+          </a:xfrm>
+          <a:prstGeom prst="rect">
+            <a:avLst/>
+          </a:prstGeom>
+          <a:noFill/>
+        </p:spPr>
+      </p:pic>
+    </p:spTree>
+  </p:cSld>
+  <p:clrMapOvr>
+    <a:masterClrMapping/>
+  </p:clrMapOvr>
+</p:sld>
+</file>
+
 <file path=ppt/theme/theme1.xml><?xml version="1.0" encoding="utf-8"?>
 <a:theme xmlns:a="http://schemas.openxmlformats.org/drawingml/2006/main" name="Office Theme">
   <a:themeElements>

</xml_diff>